<commit_message>
Update SEMINAR PROJECT MANAGENMENT.pptx
</commit_message>
<xml_diff>
--- a/SEMINAR PROJECT MANAGENMENT.pptx
+++ b/SEMINAR PROJECT MANAGENMENT.pptx
@@ -5,10 +5,10 @@
     <p:sldMasterId id="2147483696" r:id="rId1"/>
   </p:sldMasterIdLst>
   <p:notesMasterIdLst>
-    <p:notesMasterId r:id="rId9"/>
+    <p:notesMasterId r:id="rId24"/>
   </p:notesMasterIdLst>
   <p:handoutMasterIdLst>
-    <p:handoutMasterId r:id="rId10"/>
+    <p:handoutMasterId r:id="rId25"/>
   </p:handoutMasterIdLst>
   <p:sldIdLst>
     <p:sldId id="259" r:id="rId2"/>
@@ -18,6 +18,21 @@
     <p:sldId id="266" r:id="rId6"/>
     <p:sldId id="267" r:id="rId7"/>
     <p:sldId id="268" r:id="rId8"/>
+    <p:sldId id="269" r:id="rId9"/>
+    <p:sldId id="270" r:id="rId10"/>
+    <p:sldId id="271" r:id="rId11"/>
+    <p:sldId id="272" r:id="rId12"/>
+    <p:sldId id="273" r:id="rId13"/>
+    <p:sldId id="274" r:id="rId14"/>
+    <p:sldId id="275" r:id="rId15"/>
+    <p:sldId id="276" r:id="rId16"/>
+    <p:sldId id="277" r:id="rId17"/>
+    <p:sldId id="278" r:id="rId18"/>
+    <p:sldId id="279" r:id="rId19"/>
+    <p:sldId id="280" r:id="rId20"/>
+    <p:sldId id="281" r:id="rId21"/>
+    <p:sldId id="282" r:id="rId22"/>
+    <p:sldId id="283" r:id="rId23"/>
   </p:sldIdLst>
   <p:sldSz cx="12192000" cy="6858000"/>
   <p:notesSz cx="6858000" cy="9144000"/>
@@ -127,6 +142,32 @@
 </p:presentation>
 </file>
 
+<file path=ppt/commentAuthors.xml><?xml version="1.0" encoding="utf-8"?>
+<p:cmAuthorLst xmlns:a="http://schemas.openxmlformats.org/drawingml/2006/main" xmlns:r="http://schemas.openxmlformats.org/officeDocument/2006/relationships" xmlns:p="http://schemas.openxmlformats.org/presentationml/2006/main">
+  <p:cmAuthor id="1" name="Jing" initials="J" lastIdx="1" clrIdx="0">
+    <p:extLst>
+      <p:ext uri="{19B8F6BF-5375-455C-9EA6-DF929625EA0E}">
+        <p15:presenceInfo xmlns:p15="http://schemas.microsoft.com/office/powerpoint/2012/main" userId="Jing" providerId="None"/>
+      </p:ext>
+    </p:extLst>
+  </p:cmAuthor>
+</p:cmAuthorLst>
+</file>
+
+<file path=ppt/comments/comment1.xml><?xml version="1.0" encoding="utf-8"?>
+<p:cmLst xmlns:a="http://schemas.openxmlformats.org/drawingml/2006/main" xmlns:r="http://schemas.openxmlformats.org/officeDocument/2006/relationships" xmlns:p="http://schemas.openxmlformats.org/presentationml/2006/main">
+  <p:cm authorId="1" dt="2019-10-27T13:48:40.115" idx="1">
+    <p:pos x="10" y="10"/>
+    <p:text/>
+    <p:extLst>
+      <p:ext uri="{C676402C-5697-4E1C-873F-D02D1690AC5C}">
+        <p15:threadingInfo xmlns:p15="http://schemas.microsoft.com/office/powerpoint/2012/main" timeZoneBias="-420"/>
+      </p:ext>
+    </p:extLst>
+  </p:cm>
+</p:cmLst>
+</file>
+
 <file path=ppt/handoutMasters/handoutMaster1.xml><?xml version="1.0" encoding="utf-8"?>
 <p:handoutMaster xmlns:a="http://schemas.openxmlformats.org/drawingml/2006/main" xmlns:r="http://schemas.openxmlformats.org/officeDocument/2006/relationships" xmlns:p="http://schemas.openxmlformats.org/presentationml/2006/main">
   <p:cSld>
@@ -209,7 +250,7 @@
           <a:p>
             <a:fld id="{9F09733D-69F8-45CE-987F-1E3A67C77C5D}" type="datetimeFigureOut">
               <a:rPr lang="en-US" smtClean="0"/>
-              <a:t>27-10-2019</a:t>
+              <a:t>10/27/2019</a:t>
             </a:fld>
             <a:endParaRPr lang="en-US"/>
           </a:p>
@@ -374,7 +415,7 @@
           <a:p>
             <a:fld id="{4BBDC3DB-9C0B-4EEA-BE0C-C823D6258BF2}" type="datetimeFigureOut">
               <a:rPr lang="en-US" smtClean="0"/>
-              <a:t>27-10-2019</a:t>
+              <a:t>10/27/2019</a:t>
             </a:fld>
             <a:endParaRPr lang="en-US"/>
           </a:p>
@@ -876,7 +917,7 @@
             <a:fld id="{349BF3EA-1A78-4F07-BDC0-C8A1BD461199}" type="datetimeFigureOut">
               <a:rPr lang="en-US" smtClean="0"/>
               <a:pPr/>
-              <a:t>27-10-2019</a:t>
+              <a:t>10/27/2019</a:t>
             </a:fld>
             <a:endParaRPr lang="en-US"/>
           </a:p>
@@ -1074,7 +1115,7 @@
             <a:fld id="{349BF3EA-1A78-4F07-BDC0-C8A1BD461199}" type="datetimeFigureOut">
               <a:rPr lang="en-US" smtClean="0"/>
               <a:pPr/>
-              <a:t>27-10-2019</a:t>
+              <a:t>10/27/2019</a:t>
             </a:fld>
             <a:endParaRPr lang="en-US"/>
           </a:p>
@@ -1283,7 +1324,7 @@
             <a:fld id="{349BF3EA-1A78-4F07-BDC0-C8A1BD461199}" type="datetimeFigureOut">
               <a:rPr lang="en-US" smtClean="0"/>
               <a:pPr/>
-              <a:t>27-10-2019</a:t>
+              <a:t>10/27/2019</a:t>
             </a:fld>
             <a:endParaRPr lang="en-US"/>
           </a:p>
@@ -1483,7 +1524,7 @@
           <a:p>
             <a:fld id="{349BF3EA-1A78-4F07-BDC0-C8A1BD461199}" type="datetimeFigureOut">
               <a:rPr lang="en-US" smtClean="0"/>
-              <a:t>27-10-2019</a:t>
+              <a:t>10/27/2019</a:t>
             </a:fld>
             <a:endParaRPr lang="en-US"/>
           </a:p>
@@ -1733,7 +1774,7 @@
           <a:p>
             <a:fld id="{349BF3EA-1A78-4F07-BDC0-C8A1BD461199}" type="datetimeFigureOut">
               <a:rPr lang="en-US" smtClean="0"/>
-              <a:t>27-10-2019</a:t>
+              <a:t>10/27/2019</a:t>
             </a:fld>
             <a:endParaRPr lang="en-US"/>
           </a:p>
@@ -2014,7 +2055,7 @@
             <a:fld id="{349BF3EA-1A78-4F07-BDC0-C8A1BD461199}" type="datetimeFigureOut">
               <a:rPr lang="en-US" smtClean="0"/>
               <a:pPr/>
-              <a:t>27-10-2019</a:t>
+              <a:t>10/27/2019</a:t>
             </a:fld>
             <a:endParaRPr lang="en-US" dirty="0"/>
           </a:p>
@@ -2403,7 +2444,7 @@
           <a:p>
             <a:fld id="{349BF3EA-1A78-4F07-BDC0-C8A1BD461199}" type="datetimeFigureOut">
               <a:rPr lang="en-US" smtClean="0"/>
-              <a:t>27-10-2019</a:t>
+              <a:t>10/27/2019</a:t>
             </a:fld>
             <a:endParaRPr lang="en-US"/>
           </a:p>
@@ -2524,7 +2565,7 @@
           <a:p>
             <a:fld id="{349BF3EA-1A78-4F07-BDC0-C8A1BD461199}" type="datetimeFigureOut">
               <a:rPr lang="en-US" smtClean="0"/>
-              <a:t>27-10-2019</a:t>
+              <a:t>10/27/2019</a:t>
             </a:fld>
             <a:endParaRPr lang="en-US"/>
           </a:p>
@@ -2622,7 +2663,7 @@
           <a:p>
             <a:fld id="{349BF3EA-1A78-4F07-BDC0-C8A1BD461199}" type="datetimeFigureOut">
               <a:rPr lang="en-US" smtClean="0"/>
-              <a:t>27-10-2019</a:t>
+              <a:t>10/27/2019</a:t>
             </a:fld>
             <a:endParaRPr lang="en-US"/>
           </a:p>
@@ -2918,7 +2959,7 @@
           <a:p>
             <a:fld id="{349BF3EA-1A78-4F07-BDC0-C8A1BD461199}" type="datetimeFigureOut">
               <a:rPr lang="en-US" smtClean="0"/>
-              <a:t>27-10-2019</a:t>
+              <a:t>10/27/2019</a:t>
             </a:fld>
             <a:endParaRPr lang="en-US"/>
           </a:p>
@@ -3216,7 +3257,7 @@
             <a:fld id="{349BF3EA-1A78-4F07-BDC0-C8A1BD461199}" type="datetimeFigureOut">
               <a:rPr lang="en-US" smtClean="0"/>
               <a:pPr/>
-              <a:t>27-10-2019</a:t>
+              <a:t>10/27/2019</a:t>
             </a:fld>
             <a:endParaRPr lang="en-US" dirty="0"/>
           </a:p>
@@ -3458,7 +3499,7 @@
             <a:fld id="{349BF3EA-1A78-4F07-BDC0-C8A1BD461199}" type="datetimeFigureOut">
               <a:rPr lang="en-US" smtClean="0"/>
               <a:pPr/>
-              <a:t>27-10-2019</a:t>
+              <a:t>10/27/2019</a:t>
             </a:fld>
             <a:endParaRPr lang="en-US"/>
           </a:p>
@@ -37587,6 +37628,1639 @@
 </p:sld>
 </file>
 
+<file path=ppt/slides/slide10.xml><?xml version="1.0" encoding="utf-8"?>
+<p:sld xmlns:a="http://schemas.openxmlformats.org/drawingml/2006/main" xmlns:r="http://schemas.openxmlformats.org/officeDocument/2006/relationships" xmlns:p="http://schemas.openxmlformats.org/presentationml/2006/main">
+  <p:cSld>
+    <p:spTree>
+      <p:nvGrpSpPr>
+        <p:cNvPr id="1" name=""/>
+        <p:cNvGrpSpPr/>
+        <p:nvPr/>
+      </p:nvGrpSpPr>
+      <p:grpSpPr>
+        <a:xfrm>
+          <a:off x="0" y="0"/>
+          <a:ext cx="0" cy="0"/>
+          <a:chOff x="0" y="0"/>
+          <a:chExt cx="0" cy="0"/>
+        </a:xfrm>
+      </p:grpSpPr>
+      <p:sp>
+        <p:nvSpPr>
+          <p:cNvPr id="2" name="Title 1">
+            <a:extLst>
+              <a:ext uri="{FF2B5EF4-FFF2-40B4-BE49-F238E27FC236}">
+                <a16:creationId xmlns:a16="http://schemas.microsoft.com/office/drawing/2014/main" id="{60A3032F-5AF9-4605-A9FF-7A2691055D47}"/>
+              </a:ext>
+            </a:extLst>
+          </p:cNvPr>
+          <p:cNvSpPr>
+            <a:spLocks noGrp="1"/>
+          </p:cNvSpPr>
+          <p:nvPr>
+            <p:ph type="title"/>
+          </p:nvPr>
+        </p:nvSpPr>
+        <p:spPr/>
+        <p:txBody>
+          <a:bodyPr/>
+          <a:lstStyle/>
+          <a:p>
+            <a:r>
+              <a:rPr lang="en-US" dirty="0"/>
+              <a:t>Risk Management Planning</a:t>
+            </a:r>
+          </a:p>
+        </p:txBody>
+      </p:sp>
+      <p:sp>
+        <p:nvSpPr>
+          <p:cNvPr id="3" name="Content Placeholder 2">
+            <a:extLst>
+              <a:ext uri="{FF2B5EF4-FFF2-40B4-BE49-F238E27FC236}">
+                <a16:creationId xmlns:a16="http://schemas.microsoft.com/office/drawing/2014/main" id="{E0AA14E8-B8BA-42A3-979B-16D2AEF1E562}"/>
+              </a:ext>
+            </a:extLst>
+          </p:cNvPr>
+          <p:cNvSpPr>
+            <a:spLocks noGrp="1"/>
+          </p:cNvSpPr>
+          <p:nvPr>
+            <p:ph idx="1"/>
+          </p:nvPr>
+        </p:nvSpPr>
+        <p:spPr>
+          <a:xfrm>
+            <a:off x="609600" y="1846262"/>
+            <a:ext cx="10972800" cy="4691698"/>
+          </a:xfrm>
+        </p:spPr>
+        <p:txBody>
+          <a:bodyPr>
+            <a:normAutofit lnSpcReduction="10000"/>
+          </a:bodyPr>
+          <a:lstStyle/>
+          <a:p>
+            <a:pPr lvl="1">
+              <a:buFont typeface="Wingdings" panose="05000000000000000000" pitchFamily="2" charset="2"/>
+              <a:buChar char="q"/>
+            </a:pPr>
+            <a:r>
+              <a:rPr lang="en-US" sz="1900" b="1" dirty="0"/>
+              <a:t>Transfer</a:t>
+            </a:r>
+          </a:p>
+          <a:p>
+            <a:pPr lvl="2"/>
+            <a:r>
+              <a:rPr lang="en-US" sz="1900" dirty="0"/>
+              <a:t>Risk transfer is the most ideal model, from rudimentary risk transfer to insurance participation. This is the most effective and effective tool to deal with losses. (For example, instead of transporting a truck of smuggled cigarettes to the male, you divide the cigarette into smaller chunks and transport it to each different vehicle in case the police get caught. whole car cigarette)</a:t>
+            </a:r>
+          </a:p>
+          <a:p>
+            <a:pPr marL="914400" lvl="2" indent="0">
+              <a:buNone/>
+            </a:pPr>
+            <a:endParaRPr lang="en-US" sz="1900" dirty="0"/>
+          </a:p>
+          <a:p>
+            <a:pPr lvl="1">
+              <a:buFont typeface="Wingdings" panose="05000000000000000000" pitchFamily="2" charset="2"/>
+              <a:buChar char="q"/>
+            </a:pPr>
+            <a:r>
+              <a:rPr lang="en-US" sz="1900" b="1" dirty="0"/>
+              <a:t>Accept</a:t>
+            </a:r>
+          </a:p>
+          <a:p>
+            <a:pPr lvl="2"/>
+            <a:r>
+              <a:rPr lang="en-US" sz="1900" dirty="0"/>
+              <a:t>This is the form by which the victim accepts that loss and usually, there are two ways to accept the risk, which is to be proactive and passive.</a:t>
+            </a:r>
+          </a:p>
+          <a:p>
+            <a:pPr lvl="2"/>
+            <a:r>
+              <a:rPr lang="en-US" sz="1900" dirty="0"/>
+              <a:t>Passive acceptance is the absence of preparation for risk to find a solution and compensate.</a:t>
+            </a:r>
+          </a:p>
+          <a:p>
+            <a:pPr lvl="2"/>
+            <a:r>
+              <a:rPr lang="en-US" sz="1900" dirty="0"/>
+              <a:t>Proactive acceptance is the establishment of a resource reserve fund to compensate for the risks occurring. And often resources will not be used optimally, even very passively because the level of losses is not completely the same and unpredictable.</a:t>
+            </a:r>
+          </a:p>
+          <a:p>
+            <a:pPr marL="914400" lvl="2" indent="0">
+              <a:buNone/>
+            </a:pPr>
+            <a:endParaRPr lang="en-US" dirty="0"/>
+          </a:p>
+          <a:p>
+            <a:pPr marL="914400" lvl="2" indent="0">
+              <a:buNone/>
+            </a:pPr>
+            <a:endParaRPr lang="en-US" dirty="0"/>
+          </a:p>
+          <a:p>
+            <a:pPr marL="914400" lvl="2" indent="0">
+              <a:buNone/>
+            </a:pPr>
+            <a:endParaRPr lang="en-US" dirty="0"/>
+          </a:p>
+        </p:txBody>
+      </p:sp>
+    </p:spTree>
+    <p:extLst>
+      <p:ext uri="{BB962C8B-B14F-4D97-AF65-F5344CB8AC3E}">
+        <p14:creationId xmlns:p14="http://schemas.microsoft.com/office/powerpoint/2010/main" val="3888268968"/>
+      </p:ext>
+    </p:extLst>
+  </p:cSld>
+  <p:clrMapOvr>
+    <a:masterClrMapping/>
+  </p:clrMapOvr>
+</p:sld>
+</file>
+
+<file path=ppt/slides/slide11.xml><?xml version="1.0" encoding="utf-8"?>
+<p:sld xmlns:a="http://schemas.openxmlformats.org/drawingml/2006/main" xmlns:r="http://schemas.openxmlformats.org/officeDocument/2006/relationships" xmlns:p="http://schemas.openxmlformats.org/presentationml/2006/main">
+  <p:cSld>
+    <p:spTree>
+      <p:nvGrpSpPr>
+        <p:cNvPr id="1" name=""/>
+        <p:cNvGrpSpPr/>
+        <p:nvPr/>
+      </p:nvGrpSpPr>
+      <p:grpSpPr>
+        <a:xfrm>
+          <a:off x="0" y="0"/>
+          <a:ext cx="0" cy="0"/>
+          <a:chOff x="0" y="0"/>
+          <a:chExt cx="0" cy="0"/>
+        </a:xfrm>
+      </p:grpSpPr>
+      <p:sp>
+        <p:nvSpPr>
+          <p:cNvPr id="2" name="Title 1">
+            <a:extLst>
+              <a:ext uri="{FF2B5EF4-FFF2-40B4-BE49-F238E27FC236}">
+                <a16:creationId xmlns:a16="http://schemas.microsoft.com/office/drawing/2014/main" id="{8EE0ED8A-E301-4C5F-9D01-45BE7A7E1540}"/>
+              </a:ext>
+            </a:extLst>
+          </p:cNvPr>
+          <p:cNvSpPr>
+            <a:spLocks noGrp="1"/>
+          </p:cNvSpPr>
+          <p:nvPr>
+            <p:ph type="title"/>
+          </p:nvPr>
+        </p:nvSpPr>
+        <p:spPr/>
+        <p:txBody>
+          <a:bodyPr/>
+          <a:lstStyle/>
+          <a:p>
+            <a:r>
+              <a:rPr lang="en-US" dirty="0"/>
+              <a:t>Risk Management Process</a:t>
+            </a:r>
+          </a:p>
+        </p:txBody>
+      </p:sp>
+      <p:sp>
+        <p:nvSpPr>
+          <p:cNvPr id="3" name="Content Placeholder 2">
+            <a:extLst>
+              <a:ext uri="{FF2B5EF4-FFF2-40B4-BE49-F238E27FC236}">
+                <a16:creationId xmlns:a16="http://schemas.microsoft.com/office/drawing/2014/main" id="{8A017090-2EE2-49BA-B03D-E08DEE51873C}"/>
+              </a:ext>
+            </a:extLst>
+          </p:cNvPr>
+          <p:cNvSpPr>
+            <a:spLocks noGrp="1"/>
+          </p:cNvSpPr>
+          <p:nvPr>
+            <p:ph idx="1"/>
+          </p:nvPr>
+        </p:nvSpPr>
+        <p:spPr/>
+        <p:txBody>
+          <a:bodyPr>
+            <a:normAutofit/>
+          </a:bodyPr>
+          <a:lstStyle/>
+          <a:p>
+            <a:pPr marL="514350" indent="-514350">
+              <a:buFont typeface="+mj-lt"/>
+              <a:buAutoNum type="romanUcPeriod"/>
+            </a:pPr>
+            <a:r>
+              <a:rPr lang="en-US" sz="2000" b="1" dirty="0"/>
+              <a:t>What’s it?</a:t>
+            </a:r>
+          </a:p>
+          <a:p>
+            <a:pPr marL="400050" lvl="1" indent="0">
+              <a:buNone/>
+            </a:pPr>
+            <a:r>
+              <a:rPr lang="en-US" sz="1200" b="1" dirty="0"/>
+              <a:t>	</a:t>
+            </a:r>
+            <a:r>
+              <a:rPr lang="en-US" sz="2000" dirty="0"/>
+              <a:t>Project risk management is a process that includes risk assessment and mitigation 	strategies for those risks. Risk assessment includes both identifying potential 	risks 	and assessing the potential impacts of risks. A risk mitigation plan is designed to 	eliminate or minimize the impact of risk events that occur when they occur that 	negatively affect the project. Identifying risk is a creative and disciplined process. 	The creative process consists of brainstorming sessions in which the team is 	required to create a list of everything that can go wrong. All ideas are welcome 	at this 	stage with the evaluation of ideas coming later.</a:t>
+            </a:r>
+            <a:endParaRPr lang="en-US" sz="1200" dirty="0"/>
+          </a:p>
+        </p:txBody>
+      </p:sp>
+    </p:spTree>
+    <p:extLst>
+      <p:ext uri="{BB962C8B-B14F-4D97-AF65-F5344CB8AC3E}">
+        <p14:creationId xmlns:p14="http://schemas.microsoft.com/office/powerpoint/2010/main" val="1824590417"/>
+      </p:ext>
+    </p:extLst>
+  </p:cSld>
+  <p:clrMapOvr>
+    <a:masterClrMapping/>
+  </p:clrMapOvr>
+</p:sld>
+</file>
+
+<file path=ppt/slides/slide12.xml><?xml version="1.0" encoding="utf-8"?>
+<p:sld xmlns:a="http://schemas.openxmlformats.org/drawingml/2006/main" xmlns:r="http://schemas.openxmlformats.org/officeDocument/2006/relationships" xmlns:p="http://schemas.openxmlformats.org/presentationml/2006/main">
+  <p:cSld>
+    <p:spTree>
+      <p:nvGrpSpPr>
+        <p:cNvPr id="1" name=""/>
+        <p:cNvGrpSpPr/>
+        <p:nvPr/>
+      </p:nvGrpSpPr>
+      <p:grpSpPr>
+        <a:xfrm>
+          <a:off x="0" y="0"/>
+          <a:ext cx="0" cy="0"/>
+          <a:chOff x="0" y="0"/>
+          <a:chExt cx="0" cy="0"/>
+        </a:xfrm>
+      </p:grpSpPr>
+      <p:sp>
+        <p:nvSpPr>
+          <p:cNvPr id="2" name="Title 1">
+            <a:extLst>
+              <a:ext uri="{FF2B5EF4-FFF2-40B4-BE49-F238E27FC236}">
+                <a16:creationId xmlns:a16="http://schemas.microsoft.com/office/drawing/2014/main" id="{BFE5C49B-0B46-4966-A8EA-EC0713AA9309}"/>
+              </a:ext>
+            </a:extLst>
+          </p:cNvPr>
+          <p:cNvSpPr>
+            <a:spLocks noGrp="1"/>
+          </p:cNvSpPr>
+          <p:nvPr>
+            <p:ph type="title"/>
+          </p:nvPr>
+        </p:nvSpPr>
+        <p:spPr/>
+        <p:txBody>
+          <a:bodyPr/>
+          <a:lstStyle/>
+          <a:p>
+            <a:r>
+              <a:rPr lang="en-US" dirty="0"/>
+              <a:t>Risk Management Process</a:t>
+            </a:r>
+          </a:p>
+        </p:txBody>
+      </p:sp>
+      <p:sp>
+        <p:nvSpPr>
+          <p:cNvPr id="3" name="Content Placeholder 2">
+            <a:extLst>
+              <a:ext uri="{FF2B5EF4-FFF2-40B4-BE49-F238E27FC236}">
+                <a16:creationId xmlns:a16="http://schemas.microsoft.com/office/drawing/2014/main" id="{0D555A8F-4B69-4348-8BE0-3D703279B4A7}"/>
+              </a:ext>
+            </a:extLst>
+          </p:cNvPr>
+          <p:cNvSpPr>
+            <a:spLocks noGrp="1"/>
+          </p:cNvSpPr>
+          <p:nvPr>
+            <p:ph idx="1"/>
+          </p:nvPr>
+        </p:nvSpPr>
+        <p:spPr>
+          <a:xfrm>
+            <a:off x="609600" y="1846262"/>
+            <a:ext cx="10972800" cy="4440238"/>
+          </a:xfrm>
+        </p:spPr>
+        <p:txBody>
+          <a:bodyPr>
+            <a:normAutofit/>
+          </a:bodyPr>
+          <a:lstStyle/>
+          <a:p>
+            <a:pPr marL="514350" indent="-514350">
+              <a:buFont typeface="+mj-lt"/>
+              <a:buAutoNum type="romanUcPeriod" startAt="2"/>
+            </a:pPr>
+            <a:r>
+              <a:rPr lang="en-US" b="1" dirty="0"/>
+              <a:t>Risk Identification</a:t>
+            </a:r>
+          </a:p>
+          <a:p>
+            <a:pPr marL="0" indent="0">
+              <a:buNone/>
+            </a:pPr>
+            <a:r>
+              <a:rPr lang="en-US" dirty="0"/>
+              <a:t>	</a:t>
+            </a:r>
+            <a:r>
+              <a:rPr lang="en-US" sz="2000" dirty="0"/>
+              <a:t>A more disciplined process consists of using the checklist of potential risks and 	assessing the likelihood that such events may occur within the project. A number of 	companies and industries have developed a risk checklist based on experience from 	past projects. These checklists can be helpful for project managers and project teams in 	identifying both specific risks in checklists and extending team thinking. Past 	experience of the project team, project experience in the company and industry experts 	can be a valuable resource to identify potential risks to a project.</a:t>
+            </a:r>
+            <a:endParaRPr lang="en-US" dirty="0"/>
+          </a:p>
+          <a:p>
+            <a:pPr marL="0" indent="0">
+              <a:buNone/>
+            </a:pPr>
+            <a:r>
+              <a:rPr lang="en-US" dirty="0"/>
+              <a:t>	</a:t>
+            </a:r>
+            <a:r>
+              <a:rPr lang="en-US" sz="2000" dirty="0"/>
+              <a:t>Identifying sources of risk according to the portfolio is another method 	to explore 	potential risks on a project. Some examples of categories for 	potential risks 	include:</a:t>
+            </a:r>
+            <a:endParaRPr lang="en-US" dirty="0"/>
+          </a:p>
+        </p:txBody>
+      </p:sp>
+    </p:spTree>
+    <p:extLst>
+      <p:ext uri="{BB962C8B-B14F-4D97-AF65-F5344CB8AC3E}">
+        <p14:creationId xmlns:p14="http://schemas.microsoft.com/office/powerpoint/2010/main" val="2509163082"/>
+      </p:ext>
+    </p:extLst>
+  </p:cSld>
+  <p:clrMapOvr>
+    <a:masterClrMapping/>
+  </p:clrMapOvr>
+</p:sld>
+</file>
+
+<file path=ppt/slides/slide13.xml><?xml version="1.0" encoding="utf-8"?>
+<p:sld xmlns:a="http://schemas.openxmlformats.org/drawingml/2006/main" xmlns:r="http://schemas.openxmlformats.org/officeDocument/2006/relationships" xmlns:p="http://schemas.openxmlformats.org/presentationml/2006/main">
+  <p:cSld>
+    <p:spTree>
+      <p:nvGrpSpPr>
+        <p:cNvPr id="1" name=""/>
+        <p:cNvGrpSpPr/>
+        <p:nvPr/>
+      </p:nvGrpSpPr>
+      <p:grpSpPr>
+        <a:xfrm>
+          <a:off x="0" y="0"/>
+          <a:ext cx="0" cy="0"/>
+          <a:chOff x="0" y="0"/>
+          <a:chExt cx="0" cy="0"/>
+        </a:xfrm>
+      </p:grpSpPr>
+      <p:sp>
+        <p:nvSpPr>
+          <p:cNvPr id="2" name="Title 1">
+            <a:extLst>
+              <a:ext uri="{FF2B5EF4-FFF2-40B4-BE49-F238E27FC236}">
+                <a16:creationId xmlns:a16="http://schemas.microsoft.com/office/drawing/2014/main" id="{3A0FA896-1B48-40D9-AE82-EEA7CD2EC20B}"/>
+              </a:ext>
+            </a:extLst>
+          </p:cNvPr>
+          <p:cNvSpPr>
+            <a:spLocks noGrp="1"/>
+          </p:cNvSpPr>
+          <p:nvPr>
+            <p:ph type="title"/>
+          </p:nvPr>
+        </p:nvSpPr>
+        <p:spPr/>
+        <p:txBody>
+          <a:bodyPr/>
+          <a:lstStyle/>
+          <a:p>
+            <a:r>
+              <a:rPr lang="en-US" dirty="0"/>
+              <a:t>Risk Management Process</a:t>
+            </a:r>
+          </a:p>
+        </p:txBody>
+      </p:sp>
+      <p:sp>
+        <p:nvSpPr>
+          <p:cNvPr id="3" name="Content Placeholder 2">
+            <a:extLst>
+              <a:ext uri="{FF2B5EF4-FFF2-40B4-BE49-F238E27FC236}">
+                <a16:creationId xmlns:a16="http://schemas.microsoft.com/office/drawing/2014/main" id="{4AEA0958-04FB-4371-BA5D-F67F72F832D0}"/>
+              </a:ext>
+            </a:extLst>
+          </p:cNvPr>
+          <p:cNvSpPr>
+            <a:spLocks noGrp="1"/>
+          </p:cNvSpPr>
+          <p:nvPr>
+            <p:ph sz="quarter" idx="13"/>
+          </p:nvPr>
+        </p:nvSpPr>
+        <p:spPr>
+          <a:xfrm>
+            <a:off x="960120" y="2011680"/>
+            <a:ext cx="10161270" cy="4206239"/>
+          </a:xfrm>
+        </p:spPr>
+        <p:txBody>
+          <a:bodyPr>
+            <a:normAutofit lnSpcReduction="10000"/>
+          </a:bodyPr>
+          <a:lstStyle/>
+          <a:p>
+            <a:pPr lvl="0"/>
+            <a:r>
+              <a:rPr lang="en-US" dirty="0"/>
+              <a:t>Technical </a:t>
+            </a:r>
+            <a:endParaRPr lang="en-US" sz="2000" dirty="0"/>
+          </a:p>
+          <a:p>
+            <a:pPr lvl="0"/>
+            <a:r>
+              <a:rPr lang="en-US" dirty="0"/>
+              <a:t>Cost </a:t>
+            </a:r>
+          </a:p>
+          <a:p>
+            <a:pPr lvl="0"/>
+            <a:r>
+              <a:rPr lang="en-US" dirty="0"/>
+              <a:t>Schedule </a:t>
+            </a:r>
+          </a:p>
+          <a:p>
+            <a:pPr lvl="0"/>
+            <a:r>
+              <a:rPr lang="en-US" dirty="0"/>
+              <a:t>Client </a:t>
+            </a:r>
+          </a:p>
+          <a:p>
+            <a:pPr lvl="0"/>
+            <a:r>
+              <a:rPr lang="en-US" dirty="0"/>
+              <a:t>Contractual</a:t>
+            </a:r>
+          </a:p>
+          <a:p>
+            <a:pPr lvl="0"/>
+            <a:r>
+              <a:rPr lang="en-US" dirty="0"/>
+              <a:t>Weather</a:t>
+            </a:r>
+          </a:p>
+          <a:p>
+            <a:pPr lvl="0"/>
+            <a:r>
+              <a:rPr lang="en-US" dirty="0"/>
+              <a:t>Financial</a:t>
+            </a:r>
+          </a:p>
+          <a:p>
+            <a:pPr lvl="0"/>
+            <a:r>
+              <a:rPr lang="en-US" dirty="0"/>
+              <a:t>Political </a:t>
+            </a:r>
+          </a:p>
+          <a:p>
+            <a:pPr lvl="0"/>
+            <a:r>
+              <a:rPr lang="en-US" dirty="0"/>
+              <a:t>Environmental</a:t>
+            </a:r>
+          </a:p>
+          <a:p>
+            <a:pPr lvl="0"/>
+            <a:r>
+              <a:rPr lang="en-US" dirty="0"/>
+              <a:t>People</a:t>
+            </a:r>
+          </a:p>
+        </p:txBody>
+      </p:sp>
+    </p:spTree>
+    <p:extLst>
+      <p:ext uri="{BB962C8B-B14F-4D97-AF65-F5344CB8AC3E}">
+        <p14:creationId xmlns:p14="http://schemas.microsoft.com/office/powerpoint/2010/main" val="98898051"/>
+      </p:ext>
+    </p:extLst>
+  </p:cSld>
+  <p:clrMapOvr>
+    <a:masterClrMapping/>
+  </p:clrMapOvr>
+</p:sld>
+</file>
+
+<file path=ppt/slides/slide14.xml><?xml version="1.0" encoding="utf-8"?>
+<p:sld xmlns:a="http://schemas.openxmlformats.org/drawingml/2006/main" xmlns:r="http://schemas.openxmlformats.org/officeDocument/2006/relationships" xmlns:p="http://schemas.openxmlformats.org/presentationml/2006/main">
+  <p:cSld>
+    <p:spTree>
+      <p:nvGrpSpPr>
+        <p:cNvPr id="1" name=""/>
+        <p:cNvGrpSpPr/>
+        <p:nvPr/>
+      </p:nvGrpSpPr>
+      <p:grpSpPr>
+        <a:xfrm>
+          <a:off x="0" y="0"/>
+          <a:ext cx="0" cy="0"/>
+          <a:chOff x="0" y="0"/>
+          <a:chExt cx="0" cy="0"/>
+        </a:xfrm>
+      </p:grpSpPr>
+      <p:sp>
+        <p:nvSpPr>
+          <p:cNvPr id="7" name="Title 6">
+            <a:extLst>
+              <a:ext uri="{FF2B5EF4-FFF2-40B4-BE49-F238E27FC236}">
+                <a16:creationId xmlns:a16="http://schemas.microsoft.com/office/drawing/2014/main" id="{CFD16207-6C0C-4C03-B32E-1B0D41CEAB55}"/>
+              </a:ext>
+            </a:extLst>
+          </p:cNvPr>
+          <p:cNvSpPr>
+            <a:spLocks noGrp="1"/>
+          </p:cNvSpPr>
+          <p:nvPr>
+            <p:ph type="title"/>
+          </p:nvPr>
+        </p:nvSpPr>
+        <p:spPr/>
+        <p:txBody>
+          <a:bodyPr/>
+          <a:lstStyle/>
+          <a:p>
+            <a:r>
+              <a:rPr lang="en-US" dirty="0"/>
+              <a:t>Risk Management Process</a:t>
+            </a:r>
+          </a:p>
+        </p:txBody>
+      </p:sp>
+      <p:sp>
+        <p:nvSpPr>
+          <p:cNvPr id="8" name="Content Placeholder 7">
+            <a:extLst>
+              <a:ext uri="{FF2B5EF4-FFF2-40B4-BE49-F238E27FC236}">
+                <a16:creationId xmlns:a16="http://schemas.microsoft.com/office/drawing/2014/main" id="{DBA70078-A79D-4C38-A641-CCD8383F54DA}"/>
+              </a:ext>
+            </a:extLst>
+          </p:cNvPr>
+          <p:cNvSpPr>
+            <a:spLocks noGrp="1"/>
+          </p:cNvSpPr>
+          <p:nvPr>
+            <p:ph idx="1"/>
+          </p:nvPr>
+        </p:nvSpPr>
+        <p:spPr>
+          <a:xfrm>
+            <a:off x="609600" y="1846262"/>
+            <a:ext cx="10972800" cy="4428808"/>
+          </a:xfrm>
+        </p:spPr>
+        <p:txBody>
+          <a:bodyPr/>
+          <a:lstStyle/>
+          <a:p>
+            <a:r>
+              <a:rPr lang="en-US" sz="2000" dirty="0"/>
+              <a:t>In fact, depending on the business, the company, there will be different frameworks to divide the work and develop risks.</a:t>
+            </a:r>
+          </a:p>
+          <a:p>
+            <a:r>
+              <a:rPr lang="en-US" sz="2000" dirty="0"/>
+              <a:t>Here we will describe a framework to divide and develop risks which are WBS (work breakdown structure).</a:t>
+            </a:r>
+          </a:p>
+          <a:p>
+            <a:r>
+              <a:rPr lang="en-US" sz="2000" dirty="0"/>
+              <a:t>This framework divides the work and risk structure into a table with 2 columns (1 column is the task and 1 column is the possible risk at that task).</a:t>
+            </a:r>
+          </a:p>
+          <a:p>
+            <a:endParaRPr lang="en-US" dirty="0"/>
+          </a:p>
+        </p:txBody>
+      </p:sp>
+    </p:spTree>
+    <p:extLst>
+      <p:ext uri="{BB962C8B-B14F-4D97-AF65-F5344CB8AC3E}">
+        <p14:creationId xmlns:p14="http://schemas.microsoft.com/office/powerpoint/2010/main" val="3219561762"/>
+      </p:ext>
+    </p:extLst>
+  </p:cSld>
+  <p:clrMapOvr>
+    <a:masterClrMapping/>
+  </p:clrMapOvr>
+</p:sld>
+</file>
+
+<file path=ppt/slides/slide15.xml><?xml version="1.0" encoding="utf-8"?>
+<p:sld xmlns:a="http://schemas.openxmlformats.org/drawingml/2006/main" xmlns:r="http://schemas.openxmlformats.org/officeDocument/2006/relationships" xmlns:p="http://schemas.openxmlformats.org/presentationml/2006/main">
+  <p:cSld>
+    <p:spTree>
+      <p:nvGrpSpPr>
+        <p:cNvPr id="1" name=""/>
+        <p:cNvGrpSpPr/>
+        <p:nvPr/>
+      </p:nvGrpSpPr>
+      <p:grpSpPr>
+        <a:xfrm>
+          <a:off x="0" y="0"/>
+          <a:ext cx="0" cy="0"/>
+          <a:chOff x="0" y="0"/>
+          <a:chExt cx="0" cy="0"/>
+        </a:xfrm>
+      </p:grpSpPr>
+      <p:sp>
+        <p:nvSpPr>
+          <p:cNvPr id="2" name="Title 1">
+            <a:extLst>
+              <a:ext uri="{FF2B5EF4-FFF2-40B4-BE49-F238E27FC236}">
+                <a16:creationId xmlns:a16="http://schemas.microsoft.com/office/drawing/2014/main" id="{AAF3487D-DA55-45D0-A265-DEC106909C5D}"/>
+              </a:ext>
+            </a:extLst>
+          </p:cNvPr>
+          <p:cNvSpPr>
+            <a:spLocks noGrp="1"/>
+          </p:cNvSpPr>
+          <p:nvPr>
+            <p:ph type="title"/>
+          </p:nvPr>
+        </p:nvSpPr>
+        <p:spPr/>
+        <p:txBody>
+          <a:bodyPr/>
+          <a:lstStyle/>
+          <a:p>
+            <a:r>
+              <a:rPr lang="en-US" dirty="0"/>
+              <a:t>Risk Management Process</a:t>
+            </a:r>
+          </a:p>
+        </p:txBody>
+      </p:sp>
+      <p:graphicFrame>
+        <p:nvGraphicFramePr>
+          <p:cNvPr id="4" name="Content Placeholder 3">
+            <a:extLst>
+              <a:ext uri="{FF2B5EF4-FFF2-40B4-BE49-F238E27FC236}">
+                <a16:creationId xmlns:a16="http://schemas.microsoft.com/office/drawing/2014/main" id="{DC4ADC4C-F57A-4100-8DE2-4699FDA0C156}"/>
+              </a:ext>
+            </a:extLst>
+          </p:cNvPr>
+          <p:cNvGraphicFramePr>
+            <a:graphicFrameLocks noGrp="1"/>
+          </p:cNvGraphicFramePr>
+          <p:nvPr>
+            <p:ph idx="1"/>
+            <p:extLst>
+              <p:ext uri="{D42A27DB-BD31-4B8C-83A1-F6EECF244321}">
+                <p14:modId xmlns:p14="http://schemas.microsoft.com/office/powerpoint/2010/main" val="2475128842"/>
+              </p:ext>
+            </p:extLst>
+          </p:nvPr>
+        </p:nvGraphicFramePr>
+        <p:xfrm>
+          <a:off x="2057400" y="1960627"/>
+          <a:ext cx="7566660" cy="3193987"/>
+        </p:xfrm>
+        <a:graphic>
+          <a:graphicData uri="http://schemas.openxmlformats.org/drawingml/2006/table">
+            <a:tbl>
+              <a:tblPr firstRow="1" firstCol="1" bandRow="1">
+                <a:tableStyleId>{5DA37D80-6434-44D0-A028-1B22A696006F}</a:tableStyleId>
+              </a:tblPr>
+              <a:tblGrid>
+                <a:gridCol w="3789142">
+                  <a:extLst>
+                    <a:ext uri="{9D8B030D-6E8A-4147-A177-3AD203B41FA5}">
+                      <a16:colId xmlns:a16="http://schemas.microsoft.com/office/drawing/2014/main" val="1872366866"/>
+                    </a:ext>
+                  </a:extLst>
+                </a:gridCol>
+                <a:gridCol w="3777518">
+                  <a:extLst>
+                    <a:ext uri="{9D8B030D-6E8A-4147-A177-3AD203B41FA5}">
+                      <a16:colId xmlns:a16="http://schemas.microsoft.com/office/drawing/2014/main" val="1432793745"/>
+                    </a:ext>
+                  </a:extLst>
+                </a:gridCol>
+              </a:tblGrid>
+              <a:tr h="269840">
+                <a:tc>
+                  <a:txBody>
+                    <a:bodyPr/>
+                    <a:lstStyle/>
+                    <a:p>
+                      <a:pPr marL="0" marR="0">
+                        <a:lnSpc>
+                          <a:spcPts val="1320"/>
+                        </a:lnSpc>
+                        <a:spcBef>
+                          <a:spcPts val="1800"/>
+                        </a:spcBef>
+                        <a:spcAft>
+                          <a:spcPts val="0"/>
+                        </a:spcAft>
+                      </a:pPr>
+                      <a:r>
+                        <a:rPr lang="en-US" sz="1100">
+                          <a:effectLst/>
+                        </a:rPr>
+                        <a:t>Task</a:t>
+                      </a:r>
+                      <a:endParaRPr lang="en-US" sz="1100">
+                        <a:effectLst/>
+                        <a:latin typeface="Calibri" panose="020F0502020204030204" pitchFamily="34" charset="0"/>
+                        <a:ea typeface="Calibri" panose="020F0502020204030204" pitchFamily="34" charset="0"/>
+                        <a:cs typeface="Times New Roman" panose="02020603050405020304" pitchFamily="18" charset="0"/>
+                      </a:endParaRPr>
+                    </a:p>
+                  </a:txBody>
+                  <a:tcPr marL="68580" marR="68580" marT="68580" marB="68580" anchor="ctr"/>
+                </a:tc>
+                <a:tc>
+                  <a:txBody>
+                    <a:bodyPr/>
+                    <a:lstStyle/>
+                    <a:p>
+                      <a:pPr marL="0" marR="0">
+                        <a:lnSpc>
+                          <a:spcPts val="1320"/>
+                        </a:lnSpc>
+                        <a:spcBef>
+                          <a:spcPts val="1800"/>
+                        </a:spcBef>
+                        <a:spcAft>
+                          <a:spcPts val="0"/>
+                        </a:spcAft>
+                      </a:pPr>
+                      <a:r>
+                        <a:rPr lang="en-US" sz="1100">
+                          <a:effectLst/>
+                        </a:rPr>
+                        <a:t>Risk</a:t>
+                      </a:r>
+                      <a:endParaRPr lang="en-US" sz="1100">
+                        <a:effectLst/>
+                        <a:latin typeface="Calibri" panose="020F0502020204030204" pitchFamily="34" charset="0"/>
+                        <a:ea typeface="Calibri" panose="020F0502020204030204" pitchFamily="34" charset="0"/>
+                        <a:cs typeface="Times New Roman" panose="02020603050405020304" pitchFamily="18" charset="0"/>
+                      </a:endParaRPr>
+                    </a:p>
+                  </a:txBody>
+                  <a:tcPr marL="68580" marR="68580" marT="68580" marB="68580" anchor="ctr"/>
+                </a:tc>
+                <a:extLst>
+                  <a:ext uri="{0D108BD9-81ED-4DB2-BD59-A6C34878D82A}">
+                    <a16:rowId xmlns:a16="http://schemas.microsoft.com/office/drawing/2014/main" val="4111070796"/>
+                  </a:ext>
+                </a:extLst>
+              </a:tr>
+              <a:tr h="913431">
+                <a:tc>
+                  <a:txBody>
+                    <a:bodyPr/>
+                    <a:lstStyle/>
+                    <a:p>
+                      <a:pPr marL="0" marR="0">
+                        <a:lnSpc>
+                          <a:spcPts val="1320"/>
+                        </a:lnSpc>
+                        <a:spcBef>
+                          <a:spcPts val="1800"/>
+                        </a:spcBef>
+                        <a:spcAft>
+                          <a:spcPts val="0"/>
+                        </a:spcAft>
+                      </a:pPr>
+                      <a:r>
+                        <a:rPr lang="en-US" sz="1100">
+                          <a:effectLst/>
+                        </a:rPr>
+                        <a:t>Contact Dion and Carlita</a:t>
+                      </a:r>
+                      <a:endParaRPr lang="en-US" sz="1100">
+                        <a:effectLst/>
+                        <a:latin typeface="Calibri" panose="020F0502020204030204" pitchFamily="34" charset="0"/>
+                        <a:ea typeface="Calibri" panose="020F0502020204030204" pitchFamily="34" charset="0"/>
+                        <a:cs typeface="Times New Roman" panose="02020603050405020304" pitchFamily="18" charset="0"/>
+                      </a:endParaRPr>
+                    </a:p>
+                  </a:txBody>
+                  <a:tcPr marL="68580" marR="68580" marT="68580" marB="68580" anchor="ctr"/>
+                </a:tc>
+                <a:tc>
+                  <a:txBody>
+                    <a:bodyPr/>
+                    <a:lstStyle/>
+                    <a:p>
+                      <a:pPr marL="342900" marR="0" lvl="0" indent="-342900">
+                        <a:lnSpc>
+                          <a:spcPct val="107000"/>
+                        </a:lnSpc>
+                        <a:spcBef>
+                          <a:spcPts val="0"/>
+                        </a:spcBef>
+                        <a:spcAft>
+                          <a:spcPts val="800"/>
+                        </a:spcAft>
+                        <a:buSzPts val="1000"/>
+                        <a:buFont typeface="Symbol" panose="05050102010706020507" pitchFamily="18" charset="2"/>
+                        <a:buChar char=""/>
+                        <a:tabLst>
+                          <a:tab pos="457200" algn="l"/>
+                        </a:tabLst>
+                      </a:pPr>
+                      <a:r>
+                        <a:rPr lang="en-US" sz="1100">
+                          <a:effectLst/>
+                        </a:rPr>
+                        <a:t>Dion backs out</a:t>
+                      </a:r>
+                    </a:p>
+                    <a:p>
+                      <a:pPr marL="342900" marR="0" lvl="0" indent="-342900">
+                        <a:lnSpc>
+                          <a:spcPct val="107000"/>
+                        </a:lnSpc>
+                        <a:spcBef>
+                          <a:spcPts val="600"/>
+                        </a:spcBef>
+                        <a:spcAft>
+                          <a:spcPts val="800"/>
+                        </a:spcAft>
+                        <a:buSzPts val="1000"/>
+                        <a:buFont typeface="Symbol" panose="05050102010706020507" pitchFamily="18" charset="2"/>
+                        <a:buChar char=""/>
+                        <a:tabLst>
+                          <a:tab pos="457200" algn="l"/>
+                        </a:tabLst>
+                      </a:pPr>
+                      <a:r>
+                        <a:rPr lang="en-US" sz="1100">
+                          <a:effectLst/>
+                        </a:rPr>
+                        <a:t>Carlita backs out</a:t>
+                      </a:r>
+                    </a:p>
+                    <a:p>
+                      <a:pPr marL="342900" marR="0" lvl="0" indent="-342900">
+                        <a:lnSpc>
+                          <a:spcPct val="107000"/>
+                        </a:lnSpc>
+                        <a:spcBef>
+                          <a:spcPts val="600"/>
+                        </a:spcBef>
+                        <a:spcAft>
+                          <a:spcPts val="800"/>
+                        </a:spcAft>
+                        <a:buSzPts val="1000"/>
+                        <a:buFont typeface="Symbol" panose="05050102010706020507" pitchFamily="18" charset="2"/>
+                        <a:buChar char=""/>
+                        <a:tabLst>
+                          <a:tab pos="457200" algn="l"/>
+                        </a:tabLst>
+                      </a:pPr>
+                      <a:r>
+                        <a:rPr lang="en-US" sz="1100">
+                          <a:effectLst/>
+                        </a:rPr>
+                        <a:t>No common date available</a:t>
+                      </a:r>
+                      <a:endParaRPr lang="en-US" sz="1100">
+                        <a:effectLst/>
+                        <a:latin typeface="Calibri" panose="020F0502020204030204" pitchFamily="34" charset="0"/>
+                        <a:ea typeface="Calibri" panose="020F0502020204030204" pitchFamily="34" charset="0"/>
+                        <a:cs typeface="Times New Roman" panose="02020603050405020304" pitchFamily="18" charset="0"/>
+                      </a:endParaRPr>
+                    </a:p>
+                  </a:txBody>
+                  <a:tcPr marL="68580" marR="68580" marT="68580" marB="68580" anchor="ctr"/>
+                </a:tc>
+                <a:extLst>
+                  <a:ext uri="{0D108BD9-81ED-4DB2-BD59-A6C34878D82A}">
+                    <a16:rowId xmlns:a16="http://schemas.microsoft.com/office/drawing/2014/main" val="1157659401"/>
+                  </a:ext>
+                </a:extLst>
+              </a:tr>
+              <a:tr h="1073577">
+                <a:tc>
+                  <a:txBody>
+                    <a:bodyPr/>
+                    <a:lstStyle/>
+                    <a:p>
+                      <a:pPr marL="0" marR="0">
+                        <a:lnSpc>
+                          <a:spcPts val="1320"/>
+                        </a:lnSpc>
+                        <a:spcBef>
+                          <a:spcPts val="0"/>
+                        </a:spcBef>
+                        <a:spcAft>
+                          <a:spcPts val="0"/>
+                        </a:spcAft>
+                      </a:pPr>
+                      <a:r>
+                        <a:rPr lang="en-US" sz="1100" dirty="0">
+                          <a:effectLst/>
+                        </a:rPr>
+                        <a:t>Host planning lunch</a:t>
+                      </a:r>
+                      <a:endParaRPr lang="en-US" sz="1100" dirty="0">
+                        <a:effectLst/>
+                        <a:latin typeface="Calibri" panose="020F0502020204030204" pitchFamily="34" charset="0"/>
+                        <a:ea typeface="Calibri" panose="020F0502020204030204" pitchFamily="34" charset="0"/>
+                        <a:cs typeface="Times New Roman" panose="02020603050405020304" pitchFamily="18" charset="0"/>
+                      </a:endParaRPr>
+                    </a:p>
+                  </a:txBody>
+                  <a:tcPr marL="68580" marR="68580" marT="68580" marB="68580" anchor="ctr"/>
+                </a:tc>
+                <a:tc>
+                  <a:txBody>
+                    <a:bodyPr/>
+                    <a:lstStyle/>
+                    <a:p>
+                      <a:pPr marL="342900" marR="0" lvl="0" indent="-342900">
+                        <a:lnSpc>
+                          <a:spcPct val="107000"/>
+                        </a:lnSpc>
+                        <a:spcBef>
+                          <a:spcPts val="0"/>
+                        </a:spcBef>
+                        <a:spcAft>
+                          <a:spcPts val="800"/>
+                        </a:spcAft>
+                        <a:buSzPts val="1000"/>
+                        <a:buFont typeface="Symbol" panose="05050102010706020507" pitchFamily="18" charset="2"/>
+                        <a:buChar char=""/>
+                        <a:tabLst>
+                          <a:tab pos="457200" algn="l"/>
+                        </a:tabLst>
+                      </a:pPr>
+                      <a:r>
+                        <a:rPr lang="en-US" sz="1100" dirty="0">
+                          <a:effectLst/>
+                        </a:rPr>
+                        <a:t>Restaurant full or closed</a:t>
+                      </a:r>
+                    </a:p>
+                    <a:p>
+                      <a:pPr marL="342900" marR="0" lvl="0" indent="-342900">
+                        <a:lnSpc>
+                          <a:spcPct val="107000"/>
+                        </a:lnSpc>
+                        <a:spcBef>
+                          <a:spcPts val="600"/>
+                        </a:spcBef>
+                        <a:spcAft>
+                          <a:spcPts val="800"/>
+                        </a:spcAft>
+                        <a:buSzPts val="1000"/>
+                        <a:buFont typeface="Symbol" panose="05050102010706020507" pitchFamily="18" charset="2"/>
+                        <a:buChar char=""/>
+                        <a:tabLst>
+                          <a:tab pos="457200" algn="l"/>
+                        </a:tabLst>
+                      </a:pPr>
+                      <a:r>
+                        <a:rPr lang="en-US" sz="1100" dirty="0">
+                          <a:effectLst/>
+                        </a:rPr>
+                        <a:t>Wring choice of ethnic food</a:t>
+                      </a:r>
+                    </a:p>
+                    <a:p>
+                      <a:pPr marL="342900" marR="0" lvl="0" indent="-342900">
+                        <a:lnSpc>
+                          <a:spcPct val="107000"/>
+                        </a:lnSpc>
+                        <a:spcBef>
+                          <a:spcPts val="600"/>
+                        </a:spcBef>
+                        <a:spcAft>
+                          <a:spcPts val="800"/>
+                        </a:spcAft>
+                        <a:buSzPts val="1000"/>
+                        <a:buFont typeface="Symbol" panose="05050102010706020507" pitchFamily="18" charset="2"/>
+                        <a:buChar char=""/>
+                        <a:tabLst>
+                          <a:tab pos="457200" algn="l"/>
+                        </a:tabLst>
+                      </a:pPr>
+                      <a:r>
+                        <a:rPr lang="en-US" sz="1100" dirty="0">
+                          <a:effectLst/>
+                        </a:rPr>
+                        <a:t>Dion or Carlita have special food allergies or preferences</a:t>
+                      </a:r>
+                      <a:endParaRPr lang="en-US" sz="1100" dirty="0">
+                        <a:effectLst/>
+                        <a:latin typeface="Calibri" panose="020F0502020204030204" pitchFamily="34" charset="0"/>
+                        <a:ea typeface="Calibri" panose="020F0502020204030204" pitchFamily="34" charset="0"/>
+                        <a:cs typeface="Times New Roman" panose="02020603050405020304" pitchFamily="18" charset="0"/>
+                      </a:endParaRPr>
+                    </a:p>
+                  </a:txBody>
+                  <a:tcPr marL="68580" marR="68580" marT="68580" marB="68580" anchor="ctr"/>
+                </a:tc>
+                <a:extLst>
+                  <a:ext uri="{0D108BD9-81ED-4DB2-BD59-A6C34878D82A}">
+                    <a16:rowId xmlns:a16="http://schemas.microsoft.com/office/drawing/2014/main" val="3854350339"/>
+                  </a:ext>
+                </a:extLst>
+              </a:tr>
+              <a:tr h="594555">
+                <a:tc>
+                  <a:txBody>
+                    <a:bodyPr/>
+                    <a:lstStyle/>
+                    <a:p>
+                      <a:pPr marL="0" marR="0">
+                        <a:lnSpc>
+                          <a:spcPts val="1320"/>
+                        </a:lnSpc>
+                        <a:spcBef>
+                          <a:spcPts val="0"/>
+                        </a:spcBef>
+                        <a:spcAft>
+                          <a:spcPts val="0"/>
+                        </a:spcAft>
+                      </a:pPr>
+                      <a:r>
+                        <a:rPr lang="en-US" sz="1100" dirty="0">
+                          <a:effectLst/>
+                        </a:rPr>
+                        <a:t>Develop and distribute schedule</a:t>
+                      </a:r>
+                      <a:endParaRPr lang="en-US" sz="1100" dirty="0">
+                        <a:effectLst/>
+                        <a:latin typeface="Calibri" panose="020F0502020204030204" pitchFamily="34" charset="0"/>
+                        <a:ea typeface="Calibri" panose="020F0502020204030204" pitchFamily="34" charset="0"/>
+                        <a:cs typeface="Times New Roman" panose="02020603050405020304" pitchFamily="18" charset="0"/>
+                      </a:endParaRPr>
+                    </a:p>
+                  </a:txBody>
+                  <a:tcPr marL="68580" marR="68580" marT="68580" marB="68580" anchor="ctr"/>
+                </a:tc>
+                <a:tc>
+                  <a:txBody>
+                    <a:bodyPr/>
+                    <a:lstStyle/>
+                    <a:p>
+                      <a:pPr marL="342900" marR="0" lvl="0" indent="-342900">
+                        <a:lnSpc>
+                          <a:spcPct val="107000"/>
+                        </a:lnSpc>
+                        <a:spcBef>
+                          <a:spcPts val="0"/>
+                        </a:spcBef>
+                        <a:spcAft>
+                          <a:spcPts val="800"/>
+                        </a:spcAft>
+                        <a:buSzPts val="1000"/>
+                        <a:buFont typeface="Symbol" panose="05050102010706020507" pitchFamily="18" charset="2"/>
+                        <a:buChar char=""/>
+                        <a:tabLst>
+                          <a:tab pos="457200" algn="l"/>
+                        </a:tabLst>
+                      </a:pPr>
+                      <a:r>
+                        <a:rPr lang="en-US" sz="1100" dirty="0">
+                          <a:effectLst/>
+                        </a:rPr>
+                        <a:t>Printer out of toner</a:t>
+                      </a:r>
+                    </a:p>
+                    <a:p>
+                      <a:pPr marL="342900" marR="0" lvl="0" indent="-342900">
+                        <a:lnSpc>
+                          <a:spcPct val="107000"/>
+                        </a:lnSpc>
+                        <a:spcBef>
+                          <a:spcPts val="600"/>
+                        </a:spcBef>
+                        <a:spcAft>
+                          <a:spcPts val="800"/>
+                        </a:spcAft>
+                        <a:buSzPts val="1000"/>
+                        <a:buFont typeface="Symbol" panose="05050102010706020507" pitchFamily="18" charset="2"/>
+                        <a:buChar char=""/>
+                        <a:tabLst>
+                          <a:tab pos="457200" algn="l"/>
+                        </a:tabLst>
+                      </a:pPr>
+                      <a:r>
+                        <a:rPr lang="en-US" sz="1100" dirty="0">
+                          <a:effectLst/>
+                        </a:rPr>
+                        <a:t>Out of paper</a:t>
+                      </a:r>
+                      <a:endParaRPr lang="en-US" sz="1100" dirty="0">
+                        <a:effectLst/>
+                        <a:latin typeface="Calibri" panose="020F0502020204030204" pitchFamily="34" charset="0"/>
+                        <a:ea typeface="Calibri" panose="020F0502020204030204" pitchFamily="34" charset="0"/>
+                        <a:cs typeface="Times New Roman" panose="02020603050405020304" pitchFamily="18" charset="0"/>
+                      </a:endParaRPr>
+                    </a:p>
+                  </a:txBody>
+                  <a:tcPr marL="68580" marR="68580" marT="68580" marB="68580" anchor="ctr"/>
+                </a:tc>
+                <a:extLst>
+                  <a:ext uri="{0D108BD9-81ED-4DB2-BD59-A6C34878D82A}">
+                    <a16:rowId xmlns:a16="http://schemas.microsoft.com/office/drawing/2014/main" val="818746946"/>
+                  </a:ext>
+                </a:extLst>
+              </a:tr>
+            </a:tbl>
+          </a:graphicData>
+        </a:graphic>
+      </p:graphicFrame>
+    </p:spTree>
+    <p:extLst>
+      <p:ext uri="{BB962C8B-B14F-4D97-AF65-F5344CB8AC3E}">
+        <p14:creationId xmlns:p14="http://schemas.microsoft.com/office/powerpoint/2010/main" val="3428309776"/>
+      </p:ext>
+    </p:extLst>
+  </p:cSld>
+  <p:clrMapOvr>
+    <a:masterClrMapping/>
+  </p:clrMapOvr>
+</p:sld>
+</file>
+
+<file path=ppt/slides/slide16.xml><?xml version="1.0" encoding="utf-8"?>
+<p:sld xmlns:a="http://schemas.openxmlformats.org/drawingml/2006/main" xmlns:r="http://schemas.openxmlformats.org/officeDocument/2006/relationships" xmlns:p="http://schemas.openxmlformats.org/presentationml/2006/main">
+  <p:cSld>
+    <p:spTree>
+      <p:nvGrpSpPr>
+        <p:cNvPr id="1" name=""/>
+        <p:cNvGrpSpPr/>
+        <p:nvPr/>
+      </p:nvGrpSpPr>
+      <p:grpSpPr>
+        <a:xfrm>
+          <a:off x="0" y="0"/>
+          <a:ext cx="0" cy="0"/>
+          <a:chOff x="0" y="0"/>
+          <a:chExt cx="0" cy="0"/>
+        </a:xfrm>
+      </p:grpSpPr>
+      <p:sp>
+        <p:nvSpPr>
+          <p:cNvPr id="2" name="Title 1">
+            <a:extLst>
+              <a:ext uri="{FF2B5EF4-FFF2-40B4-BE49-F238E27FC236}">
+                <a16:creationId xmlns:a16="http://schemas.microsoft.com/office/drawing/2014/main" id="{5DA6D9FD-E6EE-4F33-97AE-69A280152054}"/>
+              </a:ext>
+            </a:extLst>
+          </p:cNvPr>
+          <p:cNvSpPr>
+            <a:spLocks noGrp="1"/>
+          </p:cNvSpPr>
+          <p:nvPr>
+            <p:ph type="title"/>
+          </p:nvPr>
+        </p:nvSpPr>
+        <p:spPr/>
+        <p:txBody>
+          <a:bodyPr/>
+          <a:lstStyle/>
+          <a:p>
+            <a:r>
+              <a:rPr lang="en-US" dirty="0"/>
+              <a:t>Risk Management Process</a:t>
+            </a:r>
+          </a:p>
+        </p:txBody>
+      </p:sp>
+      <p:sp>
+        <p:nvSpPr>
+          <p:cNvPr id="3" name="Content Placeholder 2">
+            <a:extLst>
+              <a:ext uri="{FF2B5EF4-FFF2-40B4-BE49-F238E27FC236}">
+                <a16:creationId xmlns:a16="http://schemas.microsoft.com/office/drawing/2014/main" id="{5E49514A-A27B-4E67-8B29-080ABAB40CB4}"/>
+              </a:ext>
+            </a:extLst>
+          </p:cNvPr>
+          <p:cNvSpPr>
+            <a:spLocks noGrp="1"/>
+          </p:cNvSpPr>
+          <p:nvPr>
+            <p:ph idx="1"/>
+          </p:nvPr>
+        </p:nvSpPr>
+        <p:spPr>
+          <a:xfrm>
+            <a:off x="609600" y="1846262"/>
+            <a:ext cx="10972800" cy="1399858"/>
+          </a:xfrm>
+        </p:spPr>
+        <p:txBody>
+          <a:bodyPr/>
+          <a:lstStyle/>
+          <a:p>
+            <a:r>
+              <a:rPr lang="en-US" dirty="0"/>
+              <a:t>This approach helps the project team identify known risks, but can be limited and less creative in identifying unknown risks and risks not easily found in WBS.</a:t>
+            </a:r>
+          </a:p>
+        </p:txBody>
+      </p:sp>
+    </p:spTree>
+    <p:extLst>
+      <p:ext uri="{BB962C8B-B14F-4D97-AF65-F5344CB8AC3E}">
+        <p14:creationId xmlns:p14="http://schemas.microsoft.com/office/powerpoint/2010/main" val="1504749891"/>
+      </p:ext>
+    </p:extLst>
+  </p:cSld>
+  <p:clrMapOvr>
+    <a:masterClrMapping/>
+  </p:clrMapOvr>
+</p:sld>
+</file>
+
+<file path=ppt/slides/slide17.xml><?xml version="1.0" encoding="utf-8"?>
+<p:sld xmlns:a="http://schemas.openxmlformats.org/drawingml/2006/main" xmlns:r="http://schemas.openxmlformats.org/officeDocument/2006/relationships" xmlns:p="http://schemas.openxmlformats.org/presentationml/2006/main">
+  <p:cSld>
+    <p:spTree>
+      <p:nvGrpSpPr>
+        <p:cNvPr id="1" name=""/>
+        <p:cNvGrpSpPr/>
+        <p:nvPr/>
+      </p:nvGrpSpPr>
+      <p:grpSpPr>
+        <a:xfrm>
+          <a:off x="0" y="0"/>
+          <a:ext cx="0" cy="0"/>
+          <a:chOff x="0" y="0"/>
+          <a:chExt cx="0" cy="0"/>
+        </a:xfrm>
+      </p:grpSpPr>
+      <p:sp>
+        <p:nvSpPr>
+          <p:cNvPr id="2" name="Title 1">
+            <a:extLst>
+              <a:ext uri="{FF2B5EF4-FFF2-40B4-BE49-F238E27FC236}">
+                <a16:creationId xmlns:a16="http://schemas.microsoft.com/office/drawing/2014/main" id="{EFEFBA1F-00CD-4B90-B7C1-FF4E6A242CA3}"/>
+              </a:ext>
+            </a:extLst>
+          </p:cNvPr>
+          <p:cNvSpPr>
+            <a:spLocks noGrp="1"/>
+          </p:cNvSpPr>
+          <p:nvPr>
+            <p:ph type="title"/>
+          </p:nvPr>
+        </p:nvSpPr>
+        <p:spPr/>
+        <p:txBody>
+          <a:bodyPr/>
+          <a:lstStyle/>
+          <a:p>
+            <a:r>
+              <a:rPr lang="en-US" dirty="0"/>
+              <a:t>Risk Management Process</a:t>
+            </a:r>
+          </a:p>
+        </p:txBody>
+      </p:sp>
+      <p:sp>
+        <p:nvSpPr>
+          <p:cNvPr id="3" name="Content Placeholder 2">
+            <a:extLst>
+              <a:ext uri="{FF2B5EF4-FFF2-40B4-BE49-F238E27FC236}">
+                <a16:creationId xmlns:a16="http://schemas.microsoft.com/office/drawing/2014/main" id="{B09139E6-136D-47C6-8870-0AA416D4457E}"/>
+              </a:ext>
+            </a:extLst>
+          </p:cNvPr>
+          <p:cNvSpPr>
+            <a:spLocks noGrp="1"/>
+          </p:cNvSpPr>
+          <p:nvPr>
+            <p:ph idx="1"/>
+          </p:nvPr>
+        </p:nvSpPr>
+        <p:spPr>
+          <a:xfrm>
+            <a:off x="609600" y="1846262"/>
+            <a:ext cx="10972800" cy="4623118"/>
+          </a:xfrm>
+        </p:spPr>
+        <p:txBody>
+          <a:bodyPr>
+            <a:normAutofit lnSpcReduction="10000"/>
+          </a:bodyPr>
+          <a:lstStyle/>
+          <a:p>
+            <a:pPr marL="514350" indent="-514350">
+              <a:buFont typeface="+mj-lt"/>
+              <a:buAutoNum type="romanUcPeriod" startAt="3"/>
+            </a:pPr>
+            <a:r>
+              <a:rPr lang="en-US" b="1" dirty="0"/>
+              <a:t>Risk Evaluation</a:t>
+            </a:r>
+          </a:p>
+          <a:p>
+            <a:pPr marL="800100" lvl="2" indent="0">
+              <a:buNone/>
+            </a:pPr>
+            <a:r>
+              <a:rPr lang="en-US" sz="2000" dirty="0"/>
+              <a:t>After identifying the potential risks, the project team will evaluate each risk based on the probability of the event of the risk and the potential loss associated with it. Not all risks are the same. Some risk events are more likely to occur than others and risk costs can vary greatly. Assessing the risk of the probability of occurrence and the severity or potential loss to the project is the next step in the risk management process.</a:t>
+            </a:r>
+          </a:p>
+          <a:p>
+            <a:pPr marL="800100" lvl="2" indent="0">
+              <a:buNone/>
+            </a:pPr>
+            <a:endParaRPr lang="en-US" sz="2000" dirty="0"/>
+          </a:p>
+          <a:p>
+            <a:pPr marL="800100" lvl="2" indent="0">
+              <a:buNone/>
+            </a:pPr>
+            <a:r>
+              <a:rPr lang="en-US" sz="2000" dirty="0"/>
+              <a:t>Having criteria to identify high impact risks can help narrow the focus to a few important risks that need to be minimized. For example, suppose that high-impact risks are those that can increase project costs by 5% of the concept budget or 2% of the detailed budget. Only a few potential risk events meet these criteria. Here are a few important potential risk events that the project management team should focus on when developing a project or management risk mitigation plan. The risk assessment is about developing an understanding of what is potentially the most likely to occur and can have the greatest negative impact on the project.</a:t>
+            </a:r>
+          </a:p>
+        </p:txBody>
+      </p:sp>
+    </p:spTree>
+    <p:extLst>
+      <p:ext uri="{BB962C8B-B14F-4D97-AF65-F5344CB8AC3E}">
+        <p14:creationId xmlns:p14="http://schemas.microsoft.com/office/powerpoint/2010/main" val="1193032713"/>
+      </p:ext>
+    </p:extLst>
+  </p:cSld>
+  <p:clrMapOvr>
+    <a:masterClrMapping/>
+  </p:clrMapOvr>
+</p:sld>
+</file>
+
+<file path=ppt/slides/slide18.xml><?xml version="1.0" encoding="utf-8"?>
+<p:sld xmlns:a="http://schemas.openxmlformats.org/drawingml/2006/main" xmlns:r="http://schemas.openxmlformats.org/officeDocument/2006/relationships" xmlns:p="http://schemas.openxmlformats.org/presentationml/2006/main">
+  <p:cSld>
+    <p:spTree>
+      <p:nvGrpSpPr>
+        <p:cNvPr id="1" name=""/>
+        <p:cNvGrpSpPr/>
+        <p:nvPr/>
+      </p:nvGrpSpPr>
+      <p:grpSpPr>
+        <a:xfrm>
+          <a:off x="0" y="0"/>
+          <a:ext cx="0" cy="0"/>
+          <a:chOff x="0" y="0"/>
+          <a:chExt cx="0" cy="0"/>
+        </a:xfrm>
+      </p:grpSpPr>
+      <p:sp>
+        <p:nvSpPr>
+          <p:cNvPr id="2" name="Title 1">
+            <a:extLst>
+              <a:ext uri="{FF2B5EF4-FFF2-40B4-BE49-F238E27FC236}">
+                <a16:creationId xmlns:a16="http://schemas.microsoft.com/office/drawing/2014/main" id="{698680FB-35CD-40A1-A23B-02902A2F9A75}"/>
+              </a:ext>
+            </a:extLst>
+          </p:cNvPr>
+          <p:cNvSpPr>
+            <a:spLocks noGrp="1"/>
+          </p:cNvSpPr>
+          <p:nvPr>
+            <p:ph type="title"/>
+          </p:nvPr>
+        </p:nvSpPr>
+        <p:spPr/>
+        <p:txBody>
+          <a:bodyPr/>
+          <a:lstStyle/>
+          <a:p>
+            <a:r>
+              <a:rPr lang="en-US" dirty="0"/>
+              <a:t>Risk Management Process</a:t>
+            </a:r>
+          </a:p>
+        </p:txBody>
+      </p:sp>
+      <p:pic>
+        <p:nvPicPr>
+          <p:cNvPr id="5" name="Content Placeholder 4">
+            <a:extLst>
+              <a:ext uri="{FF2B5EF4-FFF2-40B4-BE49-F238E27FC236}">
+                <a16:creationId xmlns:a16="http://schemas.microsoft.com/office/drawing/2014/main" id="{13D6317E-A779-44FB-8E12-9583114BE072}"/>
+              </a:ext>
+            </a:extLst>
+          </p:cNvPr>
+          <p:cNvPicPr>
+            <a:picLocks noGrp="1" noChangeAspect="1"/>
+          </p:cNvPicPr>
+          <p:nvPr>
+            <p:ph idx="1"/>
+          </p:nvPr>
+        </p:nvPicPr>
+        <p:blipFill>
+          <a:blip r:embed="rId2"/>
+          <a:stretch>
+            <a:fillRect/>
+          </a:stretch>
+        </p:blipFill>
+        <p:spPr>
+          <a:xfrm>
+            <a:off x="2986059" y="1931670"/>
+            <a:ext cx="5266401" cy="4551303"/>
+          </a:xfrm>
+        </p:spPr>
+      </p:pic>
+    </p:spTree>
+    <p:extLst>
+      <p:ext uri="{BB962C8B-B14F-4D97-AF65-F5344CB8AC3E}">
+        <p14:creationId xmlns:p14="http://schemas.microsoft.com/office/powerpoint/2010/main" val="2118954862"/>
+      </p:ext>
+    </p:extLst>
+  </p:cSld>
+  <p:clrMapOvr>
+    <a:masterClrMapping/>
+  </p:clrMapOvr>
+</p:sld>
+</file>
+
+<file path=ppt/slides/slide19.xml><?xml version="1.0" encoding="utf-8"?>
+<p:sld xmlns:a="http://schemas.openxmlformats.org/drawingml/2006/main" xmlns:r="http://schemas.openxmlformats.org/officeDocument/2006/relationships" xmlns:p="http://schemas.openxmlformats.org/presentationml/2006/main">
+  <p:cSld>
+    <p:spTree>
+      <p:nvGrpSpPr>
+        <p:cNvPr id="1" name=""/>
+        <p:cNvGrpSpPr/>
+        <p:nvPr/>
+      </p:nvGrpSpPr>
+      <p:grpSpPr>
+        <a:xfrm>
+          <a:off x="0" y="0"/>
+          <a:ext cx="0" cy="0"/>
+          <a:chOff x="0" y="0"/>
+          <a:chExt cx="0" cy="0"/>
+        </a:xfrm>
+      </p:grpSpPr>
+      <p:sp>
+        <p:nvSpPr>
+          <p:cNvPr id="2" name="Title 1">
+            <a:extLst>
+              <a:ext uri="{FF2B5EF4-FFF2-40B4-BE49-F238E27FC236}">
+                <a16:creationId xmlns:a16="http://schemas.microsoft.com/office/drawing/2014/main" id="{6176A1BA-13A3-42BF-869F-979F92570806}"/>
+              </a:ext>
+            </a:extLst>
+          </p:cNvPr>
+          <p:cNvSpPr>
+            <a:spLocks noGrp="1"/>
+          </p:cNvSpPr>
+          <p:nvPr>
+            <p:ph type="title"/>
+          </p:nvPr>
+        </p:nvSpPr>
+        <p:spPr/>
+        <p:txBody>
+          <a:bodyPr/>
+          <a:lstStyle/>
+          <a:p>
+            <a:r>
+              <a:rPr lang="en-US" dirty="0"/>
+              <a:t>Risk Management Process</a:t>
+            </a:r>
+          </a:p>
+        </p:txBody>
+      </p:sp>
+      <p:sp>
+        <p:nvSpPr>
+          <p:cNvPr id="3" name="Content Placeholder 2">
+            <a:extLst>
+              <a:ext uri="{FF2B5EF4-FFF2-40B4-BE49-F238E27FC236}">
+                <a16:creationId xmlns:a16="http://schemas.microsoft.com/office/drawing/2014/main" id="{01378B80-6ABF-4910-A55A-E6CD2B15FBAE}"/>
+              </a:ext>
+            </a:extLst>
+          </p:cNvPr>
+          <p:cNvSpPr>
+            <a:spLocks noGrp="1"/>
+          </p:cNvSpPr>
+          <p:nvPr>
+            <p:ph idx="1"/>
+          </p:nvPr>
+        </p:nvSpPr>
+        <p:spPr/>
+        <p:txBody>
+          <a:bodyPr/>
+          <a:lstStyle/>
+          <a:p>
+            <a:pPr marL="514350" indent="-514350">
+              <a:buFont typeface="+mj-lt"/>
+              <a:buAutoNum type="romanUcPeriod" startAt="4"/>
+            </a:pPr>
+            <a:r>
+              <a:rPr lang="en-US" dirty="0"/>
+              <a:t>Risk Mitigation</a:t>
+            </a:r>
+          </a:p>
+          <a:p>
+            <a:pPr marL="400050" lvl="1" indent="0">
+              <a:buNone/>
+            </a:pPr>
+            <a:r>
+              <a:rPr lang="en-US" dirty="0"/>
+              <a:t>	</a:t>
+            </a:r>
+            <a:r>
+              <a:rPr lang="en-US" sz="2000" dirty="0"/>
+              <a:t>After identifying and assessing risks, the project team developed a risk mitigation plan, 	which is intended to reduce the impact of an unexpected event. Project teams 	minimize risks in several different ways:</a:t>
+            </a:r>
+          </a:p>
+          <a:p>
+            <a:pPr lvl="3" indent="-342900">
+              <a:buFont typeface="Wingdings" panose="05000000000000000000" pitchFamily="2" charset="2"/>
+              <a:buChar char="q"/>
+            </a:pPr>
+            <a:r>
+              <a:rPr lang="en-US" sz="2000" dirty="0"/>
+              <a:t>Avoid</a:t>
+            </a:r>
+          </a:p>
+          <a:p>
+            <a:pPr lvl="3" indent="-342900">
+              <a:buFont typeface="Wingdings" panose="05000000000000000000" pitchFamily="2" charset="2"/>
+              <a:buChar char="q"/>
+            </a:pPr>
+            <a:r>
+              <a:rPr lang="en-US" sz="2000" dirty="0"/>
+              <a:t>Mitigate</a:t>
+            </a:r>
+          </a:p>
+          <a:p>
+            <a:pPr lvl="3" indent="-342900">
+              <a:buFont typeface="Wingdings" panose="05000000000000000000" pitchFamily="2" charset="2"/>
+              <a:buChar char="q"/>
+            </a:pPr>
+            <a:r>
+              <a:rPr lang="en-US" sz="2000" dirty="0"/>
+              <a:t>Transfer</a:t>
+            </a:r>
+          </a:p>
+          <a:p>
+            <a:pPr lvl="3" indent="-342900">
+              <a:buFont typeface="Wingdings" panose="05000000000000000000" pitchFamily="2" charset="2"/>
+              <a:buChar char="q"/>
+            </a:pPr>
+            <a:r>
+              <a:rPr lang="en-US" sz="2000" dirty="0"/>
+              <a:t>Accept		</a:t>
+            </a:r>
+            <a:endParaRPr lang="en-US" dirty="0"/>
+          </a:p>
+        </p:txBody>
+      </p:sp>
+    </p:spTree>
+    <p:extLst>
+      <p:ext uri="{BB962C8B-B14F-4D97-AF65-F5344CB8AC3E}">
+        <p14:creationId xmlns:p14="http://schemas.microsoft.com/office/powerpoint/2010/main" val="3155122508"/>
+      </p:ext>
+    </p:extLst>
+  </p:cSld>
+  <p:clrMapOvr>
+    <a:masterClrMapping/>
+  </p:clrMapOvr>
+</p:sld>
+</file>
+
 <file path=ppt/slides/slide2.xml><?xml version="1.0" encoding="utf-8"?>
 <p:sld xmlns:a="http://schemas.openxmlformats.org/drawingml/2006/main" xmlns:r="http://schemas.openxmlformats.org/officeDocument/2006/relationships" xmlns:p="http://schemas.openxmlformats.org/presentationml/2006/main">
   <p:cSld>
@@ -37651,7 +39325,7 @@
             <a:pPr lvl="0"/>
             <a:r>
               <a:rPr lang="en-US" dirty="0"/>
-              <a:t>Risk Identification</a:t>
+              <a:t>Risk Management Process</a:t>
             </a:r>
           </a:p>
           <a:p>
@@ -37688,6 +39362,440 @@
     <p:extLst>
       <p:ext uri="{BB962C8B-B14F-4D97-AF65-F5344CB8AC3E}">
         <p14:creationId xmlns:p14="http://schemas.microsoft.com/office/powerpoint/2010/main" val="1260473878"/>
+      </p:ext>
+    </p:extLst>
+  </p:cSld>
+  <p:clrMapOvr>
+    <a:masterClrMapping/>
+  </p:clrMapOvr>
+</p:sld>
+</file>
+
+<file path=ppt/slides/slide20.xml><?xml version="1.0" encoding="utf-8"?>
+<p:sld xmlns:a="http://schemas.openxmlformats.org/drawingml/2006/main" xmlns:r="http://schemas.openxmlformats.org/officeDocument/2006/relationships" xmlns:p="http://schemas.openxmlformats.org/presentationml/2006/main">
+  <p:cSld>
+    <p:spTree>
+      <p:nvGrpSpPr>
+        <p:cNvPr id="1" name=""/>
+        <p:cNvGrpSpPr/>
+        <p:nvPr/>
+      </p:nvGrpSpPr>
+      <p:grpSpPr>
+        <a:xfrm>
+          <a:off x="0" y="0"/>
+          <a:ext cx="0" cy="0"/>
+          <a:chOff x="0" y="0"/>
+          <a:chExt cx="0" cy="0"/>
+        </a:xfrm>
+      </p:grpSpPr>
+      <p:sp>
+        <p:nvSpPr>
+          <p:cNvPr id="2" name="Title 1">
+            <a:extLst>
+              <a:ext uri="{FF2B5EF4-FFF2-40B4-BE49-F238E27FC236}">
+                <a16:creationId xmlns:a16="http://schemas.microsoft.com/office/drawing/2014/main" id="{DC6E8865-6CC3-4653-9261-D6BE59018291}"/>
+              </a:ext>
+            </a:extLst>
+          </p:cNvPr>
+          <p:cNvSpPr>
+            <a:spLocks noGrp="1"/>
+          </p:cNvSpPr>
+          <p:nvPr>
+            <p:ph type="title"/>
+          </p:nvPr>
+        </p:nvSpPr>
+        <p:spPr/>
+        <p:txBody>
+          <a:bodyPr/>
+          <a:lstStyle/>
+          <a:p>
+            <a:r>
+              <a:rPr lang="en-US" dirty="0"/>
+              <a:t>Risk Management Process</a:t>
+            </a:r>
+          </a:p>
+        </p:txBody>
+      </p:sp>
+      <p:sp>
+        <p:nvSpPr>
+          <p:cNvPr id="3" name="Content Placeholder 2">
+            <a:extLst>
+              <a:ext uri="{FF2B5EF4-FFF2-40B4-BE49-F238E27FC236}">
+                <a16:creationId xmlns:a16="http://schemas.microsoft.com/office/drawing/2014/main" id="{AB6A57D8-FAFC-4A9F-91C5-25A3758FBAC8}"/>
+              </a:ext>
+            </a:extLst>
+          </p:cNvPr>
+          <p:cNvSpPr>
+            <a:spLocks noGrp="1"/>
+          </p:cNvSpPr>
+          <p:nvPr>
+            <p:ph idx="1"/>
+          </p:nvPr>
+        </p:nvSpPr>
+        <p:spPr/>
+        <p:txBody>
+          <a:bodyPr/>
+          <a:lstStyle/>
+          <a:p>
+            <a:pPr marL="514350" indent="-514350">
+              <a:buFont typeface="+mj-lt"/>
+              <a:buAutoNum type="romanUcPeriod" startAt="5"/>
+            </a:pPr>
+            <a:r>
+              <a:rPr lang="en-US" b="1" dirty="0"/>
+              <a:t>Contingency Plan</a:t>
+            </a:r>
+          </a:p>
+          <a:p>
+            <a:pPr marL="800100" lvl="2" indent="0">
+              <a:buNone/>
+            </a:pPr>
+            <a:r>
+              <a:rPr lang="en-US" sz="2000" dirty="0"/>
+              <a:t>Project teams often develop an alternative method to accomplish a project goal when a risk event has been identified that can discourage the achievement of that goal. These plans are called contingency plans.</a:t>
+            </a:r>
+          </a:p>
+          <a:p>
+            <a:pPr marL="800100" lvl="2" indent="0">
+              <a:buNone/>
+            </a:pPr>
+            <a:endParaRPr lang="en-US" sz="2000" dirty="0"/>
+          </a:p>
+          <a:p>
+            <a:pPr marL="800100" lvl="2" indent="0">
+              <a:buNone/>
+            </a:pPr>
+            <a:r>
+              <a:rPr lang="en-US" sz="2000" b="1" dirty="0"/>
+              <a:t>Example</a:t>
+            </a:r>
+            <a:r>
+              <a:rPr lang="en-US" sz="2000" dirty="0"/>
+              <a:t>: The risk of a strike truck driver can be mitigated by a contingency plan using a train to transport the equipment needed for the project. If a critical part of the device is late, the impact on the schedule can be minimized by changing the schedule to accommodate late device delivery.</a:t>
+            </a:r>
+          </a:p>
+        </p:txBody>
+      </p:sp>
+    </p:spTree>
+    <p:extLst>
+      <p:ext uri="{BB962C8B-B14F-4D97-AF65-F5344CB8AC3E}">
+        <p14:creationId xmlns:p14="http://schemas.microsoft.com/office/powerpoint/2010/main" val="2944101912"/>
+      </p:ext>
+    </p:extLst>
+  </p:cSld>
+  <p:clrMapOvr>
+    <a:masterClrMapping/>
+  </p:clrMapOvr>
+</p:sld>
+</file>
+
+<file path=ppt/slides/slide21.xml><?xml version="1.0" encoding="utf-8"?>
+<p:sld xmlns:a="http://schemas.openxmlformats.org/drawingml/2006/main" xmlns:r="http://schemas.openxmlformats.org/officeDocument/2006/relationships" xmlns:p="http://schemas.openxmlformats.org/presentationml/2006/main">
+  <p:cSld>
+    <p:spTree>
+      <p:nvGrpSpPr>
+        <p:cNvPr id="1" name=""/>
+        <p:cNvGrpSpPr/>
+        <p:nvPr/>
+      </p:nvGrpSpPr>
+      <p:grpSpPr>
+        <a:xfrm>
+          <a:off x="0" y="0"/>
+          <a:ext cx="0" cy="0"/>
+          <a:chOff x="0" y="0"/>
+          <a:chExt cx="0" cy="0"/>
+        </a:xfrm>
+      </p:grpSpPr>
+      <p:sp>
+        <p:nvSpPr>
+          <p:cNvPr id="2" name="Title 1">
+            <a:extLst>
+              <a:ext uri="{FF2B5EF4-FFF2-40B4-BE49-F238E27FC236}">
+                <a16:creationId xmlns:a16="http://schemas.microsoft.com/office/drawing/2014/main" id="{CD44C8EA-4DC5-4702-84EF-C21AC41BBE91}"/>
+              </a:ext>
+            </a:extLst>
+          </p:cNvPr>
+          <p:cNvSpPr>
+            <a:spLocks noGrp="1"/>
+          </p:cNvSpPr>
+          <p:nvPr>
+            <p:ph type="title"/>
+          </p:nvPr>
+        </p:nvSpPr>
+        <p:spPr/>
+        <p:txBody>
+          <a:bodyPr/>
+          <a:lstStyle/>
+          <a:p>
+            <a:r>
+              <a:rPr lang="en-US" dirty="0"/>
+              <a:t>Risk Management Process</a:t>
+            </a:r>
+          </a:p>
+        </p:txBody>
+      </p:sp>
+      <p:sp>
+        <p:nvSpPr>
+          <p:cNvPr id="3" name="Content Placeholder 2">
+            <a:extLst>
+              <a:ext uri="{FF2B5EF4-FFF2-40B4-BE49-F238E27FC236}">
+                <a16:creationId xmlns:a16="http://schemas.microsoft.com/office/drawing/2014/main" id="{E5C7DED5-3903-4A10-84A9-6443C79ECB2D}"/>
+              </a:ext>
+            </a:extLst>
+          </p:cNvPr>
+          <p:cNvSpPr>
+            <a:spLocks noGrp="1"/>
+          </p:cNvSpPr>
+          <p:nvPr>
+            <p:ph idx="1"/>
+          </p:nvPr>
+        </p:nvSpPr>
+        <p:spPr/>
+        <p:txBody>
+          <a:bodyPr>
+            <a:normAutofit fontScale="92500" lnSpcReduction="20000"/>
+          </a:bodyPr>
+          <a:lstStyle/>
+          <a:p>
+            <a:pPr marL="514350" indent="-514350">
+              <a:buFont typeface="+mj-lt"/>
+              <a:buAutoNum type="romanUcPeriod" startAt="6"/>
+            </a:pPr>
+            <a:r>
+              <a:rPr lang="en-US" b="1" dirty="0"/>
+              <a:t>Project Risk By Phases</a:t>
+            </a:r>
+          </a:p>
+          <a:p>
+            <a:pPr lvl="2" indent="-342900">
+              <a:buFont typeface="+mj-lt"/>
+              <a:buAutoNum type="alphaLcPeriod"/>
+            </a:pPr>
+            <a:r>
+              <a:rPr lang="en-US" sz="2400" b="1" dirty="0"/>
+              <a:t> </a:t>
+            </a:r>
+            <a:r>
+              <a:rPr lang="en-US" sz="2400" dirty="0"/>
+              <a:t>Initiation</a:t>
+            </a:r>
+          </a:p>
+          <a:p>
+            <a:pPr marL="1257300" lvl="3" indent="0">
+              <a:buNone/>
+            </a:pPr>
+            <a:r>
+              <a:rPr lang="en-US" sz="2400" dirty="0"/>
+              <a:t>Project risks are handled in different ways depending on the stage of the project.</a:t>
+            </a:r>
+          </a:p>
+          <a:p>
+            <a:pPr marL="1257300" lvl="3" indent="0">
+              <a:buNone/>
+            </a:pPr>
+            <a:endParaRPr lang="en-US" sz="2400" dirty="0"/>
+          </a:p>
+          <a:p>
+            <a:pPr marL="1257300" lvl="3" indent="0">
+              <a:buNone/>
+            </a:pPr>
+            <a:r>
+              <a:rPr lang="en-US" sz="2400" dirty="0"/>
+              <a:t>Start:</a:t>
+            </a:r>
+          </a:p>
+          <a:p>
+            <a:pPr marL="1257300" lvl="3" indent="0">
+              <a:buNone/>
+            </a:pPr>
+            <a:r>
+              <a:rPr lang="en-US" sz="2400" dirty="0"/>
+              <a:t>Risks related to the unknown. Many things are unknown at the start of the project, but the risks must be considered in the inception phase and weighed against the potential benefits of the project's success to decide whether or not to choose the project.</a:t>
+            </a:r>
+          </a:p>
+          <a:p>
+            <a:pPr marL="0" indent="0">
+              <a:buNone/>
+            </a:pPr>
+            <a:endParaRPr lang="en-US" dirty="0"/>
+          </a:p>
+        </p:txBody>
+      </p:sp>
+    </p:spTree>
+    <p:extLst>
+      <p:ext uri="{BB962C8B-B14F-4D97-AF65-F5344CB8AC3E}">
+        <p14:creationId xmlns:p14="http://schemas.microsoft.com/office/powerpoint/2010/main" val="3304505559"/>
+      </p:ext>
+    </p:extLst>
+  </p:cSld>
+  <p:clrMapOvr>
+    <a:masterClrMapping/>
+  </p:clrMapOvr>
+</p:sld>
+</file>
+
+<file path=ppt/slides/slide22.xml><?xml version="1.0" encoding="utf-8"?>
+<p:sld xmlns:a="http://schemas.openxmlformats.org/drawingml/2006/main" xmlns:r="http://schemas.openxmlformats.org/officeDocument/2006/relationships" xmlns:p="http://schemas.openxmlformats.org/presentationml/2006/main">
+  <p:cSld>
+    <p:spTree>
+      <p:nvGrpSpPr>
+        <p:cNvPr id="1" name=""/>
+        <p:cNvGrpSpPr/>
+        <p:nvPr/>
+      </p:nvGrpSpPr>
+      <p:grpSpPr>
+        <a:xfrm>
+          <a:off x="0" y="0"/>
+          <a:ext cx="0" cy="0"/>
+          <a:chOff x="0" y="0"/>
+          <a:chExt cx="0" cy="0"/>
+        </a:xfrm>
+      </p:grpSpPr>
+      <p:sp>
+        <p:nvSpPr>
+          <p:cNvPr id="2" name="Title 1">
+            <a:extLst>
+              <a:ext uri="{FF2B5EF4-FFF2-40B4-BE49-F238E27FC236}">
+                <a16:creationId xmlns:a16="http://schemas.microsoft.com/office/drawing/2014/main" id="{04B2F0A5-F01F-4193-850C-E6E8BAEEFE0A}"/>
+              </a:ext>
+            </a:extLst>
+          </p:cNvPr>
+          <p:cNvSpPr>
+            <a:spLocks noGrp="1"/>
+          </p:cNvSpPr>
+          <p:nvPr>
+            <p:ph type="title"/>
+          </p:nvPr>
+        </p:nvSpPr>
+        <p:spPr/>
+        <p:txBody>
+          <a:bodyPr/>
+          <a:lstStyle/>
+          <a:p>
+            <a:r>
+              <a:rPr lang="en-US" dirty="0"/>
+              <a:t>Risk Management Process</a:t>
+            </a:r>
+          </a:p>
+        </p:txBody>
+      </p:sp>
+      <p:sp>
+        <p:nvSpPr>
+          <p:cNvPr id="3" name="Content Placeholder 2">
+            <a:extLst>
+              <a:ext uri="{FF2B5EF4-FFF2-40B4-BE49-F238E27FC236}">
+                <a16:creationId xmlns:a16="http://schemas.microsoft.com/office/drawing/2014/main" id="{D92F516D-601D-48D4-BE8A-824C0723C62F}"/>
+              </a:ext>
+            </a:extLst>
+          </p:cNvPr>
+          <p:cNvSpPr>
+            <a:spLocks noGrp="1"/>
+          </p:cNvSpPr>
+          <p:nvPr>
+            <p:ph idx="1"/>
+          </p:nvPr>
+        </p:nvSpPr>
+        <p:spPr>
+          <a:xfrm>
+            <a:off x="609600" y="1846262"/>
+            <a:ext cx="10972800" cy="4645978"/>
+          </a:xfrm>
+        </p:spPr>
+        <p:txBody>
+          <a:bodyPr/>
+          <a:lstStyle/>
+          <a:p>
+            <a:pPr marL="514350" indent="-514350">
+              <a:buFont typeface="+mj-lt"/>
+              <a:buAutoNum type="romanUcPeriod" startAt="6"/>
+            </a:pPr>
+            <a:r>
+              <a:rPr lang="en-US" b="1" dirty="0"/>
+              <a:t> Project Risk By Phases</a:t>
+            </a:r>
+          </a:p>
+          <a:p>
+            <a:pPr lvl="2" indent="-342900">
+              <a:buFont typeface="+mj-lt"/>
+              <a:buAutoNum type="alphaLcPeriod" startAt="2"/>
+            </a:pPr>
+            <a:r>
+              <a:rPr lang="en-US" b="1" dirty="0"/>
+              <a:t>Planning phases</a:t>
+            </a:r>
+          </a:p>
+          <a:p>
+            <a:pPr marL="1257300" lvl="3" indent="0">
+              <a:buNone/>
+            </a:pPr>
+            <a:r>
+              <a:rPr lang="en-US" dirty="0"/>
+              <a:t>Once the project is approved and it moves into the planning stage, risks are identified for each major activity group. A risk division structure (RBS) can be used to determine the level of detailed risk analysis.</a:t>
+            </a:r>
+          </a:p>
+          <a:p>
+            <a:pPr marL="1257300" lvl="3" indent="0">
+              <a:buNone/>
+            </a:pPr>
+            <a:endParaRPr lang="en-US" dirty="0"/>
+          </a:p>
+          <a:p>
+            <a:pPr lvl="2" indent="-342900">
+              <a:buFont typeface="+mj-lt"/>
+              <a:buAutoNum type="alphaLcPeriod" startAt="2"/>
+            </a:pPr>
+            <a:r>
+              <a:rPr lang="en-US" b="1" dirty="0"/>
+              <a:t>Implementation phases</a:t>
+            </a:r>
+          </a:p>
+          <a:p>
+            <a:pPr marL="1257300" lvl="3" indent="0">
+              <a:buNone/>
+            </a:pPr>
+            <a:r>
+              <a:rPr lang="en-US" dirty="0"/>
+              <a:t>As the project progresses and more information is available to the project team, the overall risk on the project often decreases, because the activities are carried out without loss. The risk plan should be updated with new information and check the risks associated with the activities performed.</a:t>
+            </a:r>
+          </a:p>
+          <a:p>
+            <a:pPr marL="1257300" lvl="3" indent="0">
+              <a:buNone/>
+            </a:pPr>
+            <a:endParaRPr lang="en-US" dirty="0"/>
+          </a:p>
+          <a:p>
+            <a:pPr lvl="2" indent="-342900">
+              <a:buFont typeface="+mj-lt"/>
+              <a:buAutoNum type="alphaLcPeriod" startAt="2"/>
+            </a:pPr>
+            <a:r>
+              <a:rPr lang="en-US" b="1" dirty="0"/>
+              <a:t>Closeout Phases</a:t>
+            </a:r>
+          </a:p>
+          <a:p>
+            <a:pPr marL="1257300" lvl="3" indent="0">
+              <a:buNone/>
+            </a:pPr>
+            <a:r>
+              <a:rPr lang="en-US" dirty="0"/>
+              <a:t>In the closing phase, risk sharing and risk transfer arrangements should be signed and the risk-sharing structure checked to ensure that all risk events have been avoided or minimized. Final estimates of risk losses can be made and recorded as part of the project document</a:t>
+            </a:r>
+            <a:r>
+              <a:rPr lang="en-US" b="1" dirty="0"/>
+              <a:t>.</a:t>
+            </a:r>
+          </a:p>
+          <a:p>
+            <a:endParaRPr lang="en-US" dirty="0"/>
+          </a:p>
+        </p:txBody>
+      </p:sp>
+    </p:spTree>
+    <p:extLst>
+      <p:ext uri="{BB962C8B-B14F-4D97-AF65-F5344CB8AC3E}">
+        <p14:creationId xmlns:p14="http://schemas.microsoft.com/office/powerpoint/2010/main" val="1795489827"/>
       </p:ext>
     </p:extLst>
   </p:cSld>
@@ -38192,7 +40300,10 @@
           <a:bodyPr/>
           <a:lstStyle/>
           <a:p>
-            <a:endParaRPr lang="en-US"/>
+            <a:r>
+              <a:rPr lang="en-US" dirty="0"/>
+              <a:t>Risk Management Planning</a:t>
+            </a:r>
           </a:p>
         </p:txBody>
       </p:sp>
@@ -38212,12 +40323,36 @@
             <p:ph idx="1"/>
           </p:nvPr>
         </p:nvSpPr>
-        <p:spPr/>
+        <p:spPr>
+          <a:xfrm>
+            <a:off x="609600" y="1846262"/>
+            <a:ext cx="10972800" cy="2382838"/>
+          </a:xfrm>
+        </p:spPr>
         <p:txBody>
-          <a:bodyPr/>
+          <a:bodyPr>
+            <a:normAutofit/>
+          </a:bodyPr>
           <a:lstStyle/>
           <a:p>
-            <a:endParaRPr lang="en-US"/>
+            <a:pPr marL="514350" indent="-514350">
+              <a:buFont typeface="+mj-lt"/>
+              <a:buAutoNum type="romanUcPeriod"/>
+            </a:pPr>
+            <a:r>
+              <a:rPr lang="en-US" b="1" dirty="0"/>
+              <a:t>What’s risk management planning</a:t>
+            </a:r>
+          </a:p>
+          <a:p>
+            <a:pPr marL="0" indent="0">
+              <a:buNone/>
+            </a:pPr>
+            <a:r>
+              <a:rPr lang="en-US" sz="2000" dirty="0"/>
+              <a:t>	As stated above, risks are any events or conditions that affect the plan that affects the 	outcome of the project set out earlier, so what is the plan to manage risk, is the process 	by which We devise a risk management plan to approach risks scientifically and 	systematically to identify, control, prevent and minimize losses and loss of adverse 	effects of risks.</a:t>
+            </a:r>
+            <a:endParaRPr lang="en-US" dirty="0"/>
           </a:p>
         </p:txBody>
       </p:sp>
@@ -38225,6 +40360,324 @@
     <p:extLst>
       <p:ext uri="{BB962C8B-B14F-4D97-AF65-F5344CB8AC3E}">
         <p14:creationId xmlns:p14="http://schemas.microsoft.com/office/powerpoint/2010/main" val="4128436319"/>
+      </p:ext>
+    </p:extLst>
+  </p:cSld>
+  <p:clrMapOvr>
+    <a:masterClrMapping/>
+  </p:clrMapOvr>
+</p:sld>
+</file>
+
+<file path=ppt/slides/slide8.xml><?xml version="1.0" encoding="utf-8"?>
+<p:sld xmlns:a="http://schemas.openxmlformats.org/drawingml/2006/main" xmlns:r="http://schemas.openxmlformats.org/officeDocument/2006/relationships" xmlns:p="http://schemas.openxmlformats.org/presentationml/2006/main">
+  <p:cSld>
+    <p:spTree>
+      <p:nvGrpSpPr>
+        <p:cNvPr id="1" name=""/>
+        <p:cNvGrpSpPr/>
+        <p:nvPr/>
+      </p:nvGrpSpPr>
+      <p:grpSpPr>
+        <a:xfrm>
+          <a:off x="0" y="0"/>
+          <a:ext cx="0" cy="0"/>
+          <a:chOff x="0" y="0"/>
+          <a:chExt cx="0" cy="0"/>
+        </a:xfrm>
+      </p:grpSpPr>
+      <p:sp>
+        <p:nvSpPr>
+          <p:cNvPr id="2" name="Title 1">
+            <a:extLst>
+              <a:ext uri="{FF2B5EF4-FFF2-40B4-BE49-F238E27FC236}">
+                <a16:creationId xmlns:a16="http://schemas.microsoft.com/office/drawing/2014/main" id="{821EBD7B-E782-4363-A4CF-C3934671F779}"/>
+              </a:ext>
+            </a:extLst>
+          </p:cNvPr>
+          <p:cNvSpPr>
+            <a:spLocks noGrp="1"/>
+          </p:cNvSpPr>
+          <p:nvPr>
+            <p:ph type="title"/>
+          </p:nvPr>
+        </p:nvSpPr>
+        <p:spPr/>
+        <p:txBody>
+          <a:bodyPr/>
+          <a:lstStyle/>
+          <a:p>
+            <a:r>
+              <a:rPr lang="en-US" dirty="0"/>
+              <a:t>Risk Management Planning</a:t>
+            </a:r>
+          </a:p>
+        </p:txBody>
+      </p:sp>
+      <p:sp>
+        <p:nvSpPr>
+          <p:cNvPr id="3" name="Content Placeholder 2">
+            <a:extLst>
+              <a:ext uri="{FF2B5EF4-FFF2-40B4-BE49-F238E27FC236}">
+                <a16:creationId xmlns:a16="http://schemas.microsoft.com/office/drawing/2014/main" id="{F81D5BA5-61C3-44DA-A6FB-E92E017B1B04}"/>
+              </a:ext>
+            </a:extLst>
+          </p:cNvPr>
+          <p:cNvSpPr>
+            <a:spLocks noGrp="1"/>
+          </p:cNvSpPr>
+          <p:nvPr>
+            <p:ph idx="1"/>
+          </p:nvPr>
+        </p:nvSpPr>
+        <p:spPr>
+          <a:xfrm>
+            <a:off x="609600" y="1846262"/>
+            <a:ext cx="10972800" cy="3628708"/>
+          </a:xfrm>
+        </p:spPr>
+        <p:txBody>
+          <a:bodyPr>
+            <a:normAutofit fontScale="92500" lnSpcReduction="10000"/>
+          </a:bodyPr>
+          <a:lstStyle/>
+          <a:p>
+            <a:pPr marL="514350" indent="-514350">
+              <a:buFont typeface="+mj-lt"/>
+              <a:buAutoNum type="romanUcPeriod" startAt="2"/>
+            </a:pPr>
+            <a:r>
+              <a:rPr lang="en-US" b="1" dirty="0"/>
+              <a:t>Why we need to risk management planning</a:t>
+            </a:r>
+          </a:p>
+          <a:p>
+            <a:pPr marL="457200" lvl="1" indent="0">
+              <a:buNone/>
+            </a:pPr>
+            <a:r>
+              <a:rPr lang="en-US" b="1" dirty="0"/>
+              <a:t>	</a:t>
+            </a:r>
+            <a:r>
+              <a:rPr lang="en-US" sz="2000" dirty="0"/>
+              <a:t>There is no guarantee that your project will go smoothly with the plan you have set, any 	small fluctuations can occur in your project and it will also affect a somehow comes to 	the project plan and changes the results, schedule, plan of the project. And we call it risk.</a:t>
+            </a:r>
+          </a:p>
+          <a:p>
+            <a:pPr marL="457200" lvl="1" indent="0">
+              <a:buNone/>
+            </a:pPr>
+            <a:r>
+              <a:rPr lang="en-US" sz="2000" dirty="0"/>
+              <a:t>	</a:t>
+            </a:r>
+          </a:p>
+          <a:p>
+            <a:pPr marL="457200" lvl="1" indent="0">
+              <a:buNone/>
+            </a:pPr>
+            <a:r>
+              <a:rPr lang="en-US" sz="2000" dirty="0"/>
+              <a:t>	By the time the risk actually occurred to your project, it was too late to do anything about 	it. That's why you need to plan for risk in the first place and keep coming back for more 	planning throughout the project.</a:t>
+            </a:r>
+          </a:p>
+          <a:p>
+            <a:pPr marL="457200" lvl="1" indent="0">
+              <a:buNone/>
+            </a:pPr>
+            <a:endParaRPr lang="en-US" sz="2000" dirty="0"/>
+          </a:p>
+          <a:p>
+            <a:pPr marL="457200" lvl="1" indent="0">
+              <a:buNone/>
+            </a:pPr>
+            <a:r>
+              <a:rPr lang="en-US" sz="2000" dirty="0"/>
+              <a:t>	The risk management plan tells you how you will handle risks in your project. This 	document records how you assess the risk, who is responsible for the 	implementation, and how often you conduct risk 	planning.</a:t>
+            </a:r>
+          </a:p>
+        </p:txBody>
+      </p:sp>
+    </p:spTree>
+    <p:extLst>
+      <p:ext uri="{BB962C8B-B14F-4D97-AF65-F5344CB8AC3E}">
+        <p14:creationId xmlns:p14="http://schemas.microsoft.com/office/powerpoint/2010/main" val="2721917731"/>
+      </p:ext>
+    </p:extLst>
+  </p:cSld>
+  <p:clrMapOvr>
+    <a:masterClrMapping/>
+  </p:clrMapOvr>
+</p:sld>
+</file>
+
+<file path=ppt/slides/slide9.xml><?xml version="1.0" encoding="utf-8"?>
+<p:sld xmlns:a="http://schemas.openxmlformats.org/drawingml/2006/main" xmlns:r="http://schemas.openxmlformats.org/officeDocument/2006/relationships" xmlns:p="http://schemas.openxmlformats.org/presentationml/2006/main">
+  <p:cSld>
+    <p:spTree>
+      <p:nvGrpSpPr>
+        <p:cNvPr id="1" name=""/>
+        <p:cNvGrpSpPr/>
+        <p:nvPr/>
+      </p:nvGrpSpPr>
+      <p:grpSpPr>
+        <a:xfrm>
+          <a:off x="0" y="0"/>
+          <a:ext cx="0" cy="0"/>
+          <a:chOff x="0" y="0"/>
+          <a:chExt cx="0" cy="0"/>
+        </a:xfrm>
+      </p:grpSpPr>
+      <p:sp>
+        <p:nvSpPr>
+          <p:cNvPr id="2" name="Title 1">
+            <a:extLst>
+              <a:ext uri="{FF2B5EF4-FFF2-40B4-BE49-F238E27FC236}">
+                <a16:creationId xmlns:a16="http://schemas.microsoft.com/office/drawing/2014/main" id="{A0D5578D-94AE-4863-A226-5C1949480AC1}"/>
+              </a:ext>
+            </a:extLst>
+          </p:cNvPr>
+          <p:cNvSpPr>
+            <a:spLocks noGrp="1"/>
+          </p:cNvSpPr>
+          <p:nvPr>
+            <p:ph type="title"/>
+          </p:nvPr>
+        </p:nvSpPr>
+        <p:spPr/>
+        <p:txBody>
+          <a:bodyPr/>
+          <a:lstStyle/>
+          <a:p>
+            <a:r>
+              <a:rPr lang="en-US" dirty="0"/>
+              <a:t>Risk Management Planning</a:t>
+            </a:r>
+          </a:p>
+        </p:txBody>
+      </p:sp>
+      <p:sp>
+        <p:nvSpPr>
+          <p:cNvPr id="3" name="Content Placeholder 2">
+            <a:extLst>
+              <a:ext uri="{FF2B5EF4-FFF2-40B4-BE49-F238E27FC236}">
+                <a16:creationId xmlns:a16="http://schemas.microsoft.com/office/drawing/2014/main" id="{F60FA422-85D3-4D8E-9C8F-4ED7610252B3}"/>
+              </a:ext>
+            </a:extLst>
+          </p:cNvPr>
+          <p:cNvSpPr>
+            <a:spLocks noGrp="1"/>
+          </p:cNvSpPr>
+          <p:nvPr>
+            <p:ph idx="1"/>
+          </p:nvPr>
+        </p:nvSpPr>
+        <p:spPr>
+          <a:xfrm>
+            <a:off x="609600" y="1846262"/>
+            <a:ext cx="10972800" cy="3903028"/>
+          </a:xfrm>
+        </p:spPr>
+        <p:txBody>
+          <a:bodyPr>
+            <a:normAutofit fontScale="92500" lnSpcReduction="10000"/>
+          </a:bodyPr>
+          <a:lstStyle/>
+          <a:p>
+            <a:pPr marL="514350" indent="-514350">
+              <a:buFont typeface="+mj-lt"/>
+              <a:buAutoNum type="romanUcPeriod" startAt="3"/>
+            </a:pPr>
+            <a:r>
+              <a:rPr lang="en-US" b="1" dirty="0"/>
+              <a:t>How to deal with risk.</a:t>
+            </a:r>
+          </a:p>
+          <a:p>
+            <a:pPr marL="0" indent="0">
+              <a:buNone/>
+            </a:pPr>
+            <a:r>
+              <a:rPr lang="en-US" dirty="0"/>
+              <a:t>	</a:t>
+            </a:r>
+            <a:r>
+              <a:rPr lang="en-US" sz="2000" dirty="0"/>
+              <a:t>When you plan your project, the risks are still uncertain. But in the end, some of the 	risks 	you plan to take place, and that's when you need to deal with them. And here we 	have 	four basic ways to handle risk</a:t>
+            </a:r>
+          </a:p>
+          <a:p>
+            <a:pPr marL="0" indent="0">
+              <a:buNone/>
+            </a:pPr>
+            <a:endParaRPr lang="en-US" sz="2000" dirty="0"/>
+          </a:p>
+          <a:p>
+            <a:pPr lvl="1">
+              <a:buFont typeface="Wingdings" panose="05000000000000000000" pitchFamily="2" charset="2"/>
+              <a:buChar char="q"/>
+            </a:pPr>
+            <a:r>
+              <a:rPr lang="en-US" sz="2000" b="1" dirty="0"/>
+              <a:t>Avoid</a:t>
+            </a:r>
+          </a:p>
+          <a:p>
+            <a:pPr lvl="2"/>
+            <a:r>
+              <a:rPr lang="en-US" sz="2000" dirty="0"/>
+              <a:t>Is trying to avoid, eliminate or minimize the likelihood of risk (it's like you will limit or not go out at 12 pm to avoid being killed)</a:t>
+            </a:r>
+          </a:p>
+          <a:p>
+            <a:pPr marL="914400" lvl="2" indent="0">
+              <a:buNone/>
+            </a:pPr>
+            <a:endParaRPr lang="en-US" sz="2000" dirty="0"/>
+          </a:p>
+          <a:p>
+            <a:pPr lvl="1">
+              <a:buFont typeface="Wingdings" panose="05000000000000000000" pitchFamily="2" charset="2"/>
+              <a:buChar char="q"/>
+            </a:pPr>
+            <a:r>
+              <a:rPr lang="en-US" sz="2000" b="1" dirty="0"/>
+              <a:t>Mitigate</a:t>
+            </a:r>
+          </a:p>
+          <a:p>
+            <a:pPr lvl="2"/>
+            <a:r>
+              <a:rPr lang="en-US" sz="2000" dirty="0"/>
+              <a:t>As a measure to minimize the possible damage (this method is like you wear a helmet when driving to minimize the possibility of an accident and injure you)</a:t>
+            </a:r>
+          </a:p>
+          <a:p>
+            <a:pPr marL="0" indent="0">
+              <a:buNone/>
+            </a:pPr>
+            <a:endParaRPr lang="en-US" dirty="0"/>
+          </a:p>
+          <a:p>
+            <a:pPr marL="514350" indent="-514350">
+              <a:buFont typeface="+mj-lt"/>
+              <a:buAutoNum type="romanUcPeriod" startAt="3"/>
+            </a:pPr>
+            <a:endParaRPr lang="en-US" dirty="0"/>
+          </a:p>
+          <a:p>
+            <a:pPr marL="0" indent="0">
+              <a:buNone/>
+            </a:pPr>
+            <a:endParaRPr lang="en-US" dirty="0"/>
+          </a:p>
+        </p:txBody>
+      </p:sp>
+    </p:spTree>
+    <p:extLst>
+      <p:ext uri="{BB962C8B-B14F-4D97-AF65-F5344CB8AC3E}">
+        <p14:creationId xmlns:p14="http://schemas.microsoft.com/office/powerpoint/2010/main" val="3296775831"/>
       </p:ext>
     </p:extLst>
   </p:cSld>

</xml_diff>